<commit_message>
Deployed 22205bc with MkDocs version: 1.4.3
</commit_message>
<xml_diff>
--- a/assets/pptx/RNA-Seq_07_Enrichment_analysis.pptx
+++ b/assets/pptx/RNA-Seq_07_Enrichment_analysis.pptx
@@ -29,6 +29,11 @@
     <p:sldId id="272" r:id="rId22"/>
     <p:sldId id="273" r:id="rId23"/>
     <p:sldId id="274" r:id="rId24"/>
+    <p:sldId id="275" r:id="rId25"/>
+    <p:sldId id="276" r:id="rId26"/>
+    <p:sldId id="277" r:id="rId27"/>
+    <p:sldId id="278" r:id="rId28"/>
+    <p:sldId id="279" r:id="rId29"/>
   </p:sldIdLst>
   <p:sldSz cx="9144000" cy="6858000"/>
   <p:notesSz cx="6858000" cy="9144000"/>
@@ -259,7 +264,7 @@
           </a:bodyPr>
           <a:p>
             <a:pPr algn="r"/>
-            <a:fld id="{66AB3ADF-B466-4C1C-B286-ABBDFB3545F4}" type="slidenum">
+            <a:fld id="{A853A183-725E-4723-8B58-23041FAD6D3B}" type="slidenum">
               <a:rPr b="0" lang="en-US" sz="1400" spc="-1" strike="noStrike">
                 <a:latin typeface="Times New Roman"/>
               </a:rPr>
@@ -296,7 +301,7 @@
       </p:grpSpPr>
       <p:sp>
         <p:nvSpPr>
-          <p:cNvPr id="193" name="PlaceHolder 1"/>
+          <p:cNvPr id="224" name="PlaceHolder 1"/>
           <p:cNvSpPr>
             <a:spLocks noGrp="1"/>
           </p:cNvSpPr>
@@ -307,16 +312,16 @@
         <p:spPr>
           <a:xfrm>
             <a:off x="1143000" y="685800"/>
-            <a:ext cx="4569120" cy="3426120"/>
-          </a:xfrm>
-          <a:prstGeom prst="rect">
-            <a:avLst/>
-          </a:prstGeom>
-        </p:spPr>
-      </p:sp>
-      <p:sp>
-        <p:nvSpPr>
-          <p:cNvPr id="194" name="PlaceHolder 2"/>
+            <a:ext cx="4568760" cy="3425760"/>
+          </a:xfrm>
+          <a:prstGeom prst="rect">
+            <a:avLst/>
+          </a:prstGeom>
+        </p:spPr>
+      </p:sp>
+      <p:sp>
+        <p:nvSpPr>
+          <p:cNvPr id="225" name="PlaceHolder 2"/>
           <p:cNvSpPr>
             <a:spLocks noGrp="1"/>
           </p:cNvSpPr>
@@ -327,7 +332,7 @@
         <p:spPr>
           <a:xfrm>
             <a:off x="685800" y="4343400"/>
-            <a:ext cx="5483520" cy="4111920"/>
+            <a:ext cx="5483160" cy="4111560"/>
           </a:xfrm>
           <a:prstGeom prst="rect">
             <a:avLst/>
@@ -346,14 +351,14 @@
       </p:sp>
       <p:sp>
         <p:nvSpPr>
-          <p:cNvPr id="195" name="CustomShape 3"/>
+          <p:cNvPr id="226" name="CustomShape 3"/>
           <p:cNvSpPr/>
           <p:nvPr/>
         </p:nvSpPr>
         <p:spPr>
           <a:xfrm>
             <a:off x="3884760" y="8685360"/>
-            <a:ext cx="2968920" cy="454320"/>
+            <a:ext cx="2968560" cy="453960"/>
           </a:xfrm>
           <a:prstGeom prst="rect">
             <a:avLst/>
@@ -379,7 +384,7 @@
                 <a:spcPct val="100000"/>
               </a:lnSpc>
             </a:pPr>
-            <a:fld id="{77961045-B7EF-40B2-BA8E-BA0000A9788D}" type="slidenum">
+            <a:fld id="{8A06A605-E24B-4B97-ACEF-3E9753C32201}" type="slidenum">
               <a:rPr b="0" lang="en-US" sz="1200" spc="-1" strike="noStrike">
                 <a:solidFill>
                   <a:srgbClr val="000000"/>
@@ -4505,7 +4510,7 @@
         <p:spPr>
           <a:xfrm>
             <a:off x="252000" y="6285240"/>
-            <a:ext cx="792720" cy="381240"/>
+            <a:ext cx="792360" cy="380880"/>
           </a:xfrm>
           <a:prstGeom prst="rect">
             <a:avLst/>
@@ -4529,7 +4534,7 @@
         <p:spPr>
           <a:xfrm>
             <a:off x="1214280" y="6154200"/>
-            <a:ext cx="6256800" cy="631800"/>
+            <a:ext cx="6256440" cy="631440"/>
           </a:xfrm>
           <a:prstGeom prst="rect">
             <a:avLst/>
@@ -4548,7 +4553,7 @@
         <p:spPr>
           <a:xfrm>
             <a:off x="7500960" y="6485760"/>
-            <a:ext cx="1483560" cy="306360"/>
+            <a:ext cx="1483200" cy="306000"/>
           </a:xfrm>
           <a:prstGeom prst="rect">
             <a:avLst/>
@@ -4947,49 +4952,7 @@
               <a:rPr b="0" lang="en-US" sz="4400" spc="-1" strike="noStrike">
                 <a:latin typeface="Arial"/>
               </a:rPr>
-              <a:t>Click </a:t>
-            </a:r>
-            <a:r>
-              <a:rPr b="0" lang="en-US" sz="4400" spc="-1" strike="noStrike">
-                <a:latin typeface="Arial"/>
-              </a:rPr>
-              <a:t>to </a:t>
-            </a:r>
-            <a:r>
-              <a:rPr b="0" lang="en-US" sz="4400" spc="-1" strike="noStrike">
-                <a:latin typeface="Arial"/>
-              </a:rPr>
-              <a:t>edit </a:t>
-            </a:r>
-            <a:r>
-              <a:rPr b="0" lang="en-US" sz="4400" spc="-1" strike="noStrike">
-                <a:latin typeface="Arial"/>
-              </a:rPr>
-              <a:t>the </a:t>
-            </a:r>
-            <a:r>
-              <a:rPr b="0" lang="en-US" sz="4400" spc="-1" strike="noStrike">
-                <a:latin typeface="Arial"/>
-              </a:rPr>
-              <a:t>title </a:t>
-            </a:r>
-            <a:r>
-              <a:rPr b="0" lang="en-US" sz="4400" spc="-1" strike="noStrike">
-                <a:latin typeface="Arial"/>
-              </a:rPr>
-              <a:t>text </a:t>
-            </a:r>
-            <a:r>
-              <a:rPr b="0" lang="en-US" sz="4400" spc="-1" strike="noStrike">
-                <a:latin typeface="Arial"/>
-              </a:rPr>
-              <a:t>forma</a:t>
-            </a:r>
-            <a:r>
-              <a:rPr b="0" lang="en-US" sz="4400" spc="-1" strike="noStrike">
-                <a:latin typeface="Arial"/>
-              </a:rPr>
-              <a:t>t</a:t>
+              <a:t>Click to edit the title text format</a:t>
             </a:r>
             <a:endParaRPr b="0" lang="en-US" sz="4400" spc="-1" strike="noStrike">
               <a:latin typeface="Arial"/>
@@ -5233,7 +5196,7 @@
         <p:spPr>
           <a:xfrm>
             <a:off x="252000" y="6285240"/>
-            <a:ext cx="792720" cy="381240"/>
+            <a:ext cx="792360" cy="380880"/>
           </a:xfrm>
           <a:prstGeom prst="rect">
             <a:avLst/>
@@ -5257,7 +5220,7 @@
         <p:spPr>
           <a:xfrm>
             <a:off x="1214280" y="6154200"/>
-            <a:ext cx="6256800" cy="631800"/>
+            <a:ext cx="6256440" cy="631440"/>
           </a:xfrm>
           <a:prstGeom prst="rect">
             <a:avLst/>
@@ -5276,7 +5239,7 @@
         <p:spPr>
           <a:xfrm>
             <a:off x="7500960" y="6485760"/>
-            <a:ext cx="1483560" cy="306360"/>
+            <a:ext cx="1483200" cy="306000"/>
           </a:xfrm>
           <a:prstGeom prst="rect">
             <a:avLst/>
@@ -5580,7 +5543,7 @@
         <p:spPr>
           <a:xfrm>
             <a:off x="504000" y="4129200"/>
-            <a:ext cx="8457480" cy="465120"/>
+            <a:ext cx="8457120" cy="464760"/>
           </a:xfrm>
           <a:prstGeom prst="rect">
             <a:avLst/>
@@ -5631,7 +5594,7 @@
         <p:spPr>
           <a:xfrm>
             <a:off x="504000" y="4964400"/>
-            <a:ext cx="8097120" cy="783000"/>
+            <a:ext cx="8096760" cy="782640"/>
           </a:xfrm>
           <a:prstGeom prst="rect">
             <a:avLst/>
@@ -5703,7 +5666,7 @@
         <p:spPr>
           <a:xfrm>
             <a:off x="0" y="0"/>
-            <a:ext cx="9141120" cy="3426120"/>
+            <a:ext cx="9140760" cy="3425760"/>
           </a:xfrm>
           <a:prstGeom prst="rect">
             <a:avLst/>
@@ -5760,7 +5723,7 @@
         <p:spPr>
           <a:xfrm>
             <a:off x="7448400" y="3286080"/>
-            <a:ext cx="1326240" cy="717120"/>
+            <a:ext cx="1325880" cy="716760"/>
           </a:xfrm>
           <a:prstGeom prst="rect">
             <a:avLst/>
@@ -5838,7 +5801,7 @@
         <p:spPr>
           <a:xfrm>
             <a:off x="504000" y="404640"/>
-            <a:ext cx="8385480" cy="477360"/>
+            <a:ext cx="8385120" cy="477000"/>
           </a:xfrm>
           <a:prstGeom prst="rect">
             <a:avLst/>
@@ -5889,7 +5852,7 @@
         <p:spPr>
           <a:xfrm>
             <a:off x="504000" y="1340640"/>
-            <a:ext cx="8097120" cy="5397840"/>
+            <a:ext cx="8096760" cy="5397480"/>
           </a:xfrm>
           <a:prstGeom prst="rect">
             <a:avLst/>
@@ -6003,13 +5966,13 @@
         </p:nvPicPr>
         <p:blipFill>
           <a:blip r:embed="rId2"/>
-          <a:srcRect l="0" t="0" r="0" b="45334"/>
+          <a:srcRect l="0" t="0" r="0" b="45343"/>
           <a:stretch/>
         </p:blipFill>
         <p:spPr>
           <a:xfrm>
             <a:off x="291960" y="2377440"/>
-            <a:ext cx="4279320" cy="3747960"/>
+            <a:ext cx="4278960" cy="3747600"/>
           </a:xfrm>
           <a:prstGeom prst="rect">
             <a:avLst/>
@@ -6027,13 +5990,13 @@
         </p:nvPicPr>
         <p:blipFill>
           <a:blip r:embed="rId3"/>
-          <a:srcRect l="0" t="54662" r="0" b="0"/>
+          <a:srcRect l="0" t="54670" r="0" b="0"/>
           <a:stretch/>
         </p:blipFill>
         <p:spPr>
           <a:xfrm>
             <a:off x="4589640" y="2377440"/>
-            <a:ext cx="4279320" cy="3107880"/>
+            <a:ext cx="4278960" cy="3107520"/>
           </a:xfrm>
           <a:prstGeom prst="rect">
             <a:avLst/>
@@ -6077,7 +6040,7 @@
         <p:spPr>
           <a:xfrm>
             <a:off x="504000" y="404640"/>
-            <a:ext cx="8385480" cy="477360"/>
+            <a:ext cx="8385120" cy="477000"/>
           </a:xfrm>
           <a:prstGeom prst="rect">
             <a:avLst/>
@@ -6128,7 +6091,7 @@
         <p:spPr>
           <a:xfrm>
             <a:off x="504000" y="1340640"/>
-            <a:ext cx="8097120" cy="5397840"/>
+            <a:ext cx="8096760" cy="5397480"/>
           </a:xfrm>
           <a:prstGeom prst="rect">
             <a:avLst/>
@@ -6247,7 +6210,7 @@
         <p:spPr>
           <a:xfrm>
             <a:off x="137520" y="1717920"/>
-            <a:ext cx="6320880" cy="4852800"/>
+            <a:ext cx="6320520" cy="4852440"/>
           </a:xfrm>
           <a:prstGeom prst="rect">
             <a:avLst/>
@@ -6266,7 +6229,7 @@
         <p:spPr>
           <a:xfrm>
             <a:off x="6371280" y="5702400"/>
-            <a:ext cx="2740320" cy="1035360"/>
+            <a:ext cx="2739960" cy="1035000"/>
           </a:xfrm>
           <a:prstGeom prst="rect">
             <a:avLst/>
@@ -6412,7 +6375,7 @@
         <p:spPr>
           <a:xfrm>
             <a:off x="504000" y="404640"/>
-            <a:ext cx="8385480" cy="477360"/>
+            <a:ext cx="8385120" cy="477000"/>
           </a:xfrm>
           <a:prstGeom prst="rect">
             <a:avLst/>
@@ -6463,7 +6426,7 @@
         <p:spPr>
           <a:xfrm>
             <a:off x="504000" y="1340640"/>
-            <a:ext cx="8097120" cy="5397840"/>
+            <a:ext cx="8096760" cy="5397480"/>
           </a:xfrm>
           <a:prstGeom prst="rect">
             <a:avLst/>
@@ -6484,7 +6447,7 @@
             <a:noAutofit/>
           </a:bodyPr>
           <a:p>
-            <a:pPr lvl="1" marL="360000" indent="-357120">
+            <a:pPr lvl="1" marL="360000" indent="-356760">
               <a:lnSpc>
                 <a:spcPct val="100000"/>
               </a:lnSpc>
@@ -6511,7 +6474,7 @@
             </a:endParaRPr>
           </a:p>
           <a:p>
-            <a:pPr lvl="1" marL="360000" indent="-357120">
+            <a:pPr lvl="1" marL="360000" indent="-356760">
               <a:lnSpc>
                 <a:spcPct val="100000"/>
               </a:lnSpc>
@@ -6538,7 +6501,7 @@
             </a:endParaRPr>
           </a:p>
           <a:p>
-            <a:pPr lvl="1" marL="360000" indent="-357120">
+            <a:pPr lvl="1" marL="360000" indent="-356760">
               <a:lnSpc>
                 <a:spcPct val="100000"/>
               </a:lnSpc>
@@ -6565,7 +6528,7 @@
             </a:endParaRPr>
           </a:p>
           <a:p>
-            <a:pPr lvl="1" marL="360000" indent="-357120">
+            <a:pPr lvl="1" marL="360000" indent="-356760">
               <a:lnSpc>
                 <a:spcPct val="100000"/>
               </a:lnSpc>
@@ -6592,7 +6555,7 @@
             </a:endParaRPr>
           </a:p>
           <a:p>
-            <a:pPr lvl="1" marL="360000" indent="-357120">
+            <a:pPr lvl="1" marL="360000" indent="-356760">
               <a:lnSpc>
                 <a:spcPct val="100000"/>
               </a:lnSpc>
@@ -6667,7 +6630,7 @@
         <p:spPr>
           <a:xfrm>
             <a:off x="504000" y="404640"/>
-            <a:ext cx="8385480" cy="477360"/>
+            <a:ext cx="8385120" cy="477000"/>
           </a:xfrm>
           <a:prstGeom prst="rect">
             <a:avLst/>
@@ -6728,7 +6691,7 @@
         <p:spPr>
           <a:xfrm>
             <a:off x="504000" y="1340640"/>
-            <a:ext cx="8097120" cy="5397840"/>
+            <a:ext cx="8096760" cy="5397480"/>
           </a:xfrm>
           <a:prstGeom prst="rect">
             <a:avLst/>
@@ -6749,7 +6712,7 @@
             <a:noAutofit/>
           </a:bodyPr>
           <a:p>
-            <a:pPr lvl="1" marL="360000" indent="-357120">
+            <a:pPr lvl="1" marL="360000" indent="-356760">
               <a:lnSpc>
                 <a:spcPct val="100000"/>
               </a:lnSpc>
@@ -6776,7 +6739,7 @@
             </a:endParaRPr>
           </a:p>
           <a:p>
-            <a:pPr lvl="1" marL="360000" indent="-357120">
+            <a:pPr lvl="1" marL="360000" indent="-356760">
               <a:lnSpc>
                 <a:spcPct val="100000"/>
               </a:lnSpc>
@@ -6803,7 +6766,7 @@
             </a:endParaRPr>
           </a:p>
           <a:p>
-            <a:pPr lvl="1" marL="360000" indent="-357120">
+            <a:pPr lvl="1" marL="360000" indent="-356760">
               <a:lnSpc>
                 <a:spcPct val="100000"/>
               </a:lnSpc>
@@ -6904,7 +6867,7 @@
         <p:spPr>
           <a:xfrm>
             <a:off x="504000" y="404640"/>
-            <a:ext cx="8385480" cy="477360"/>
+            <a:ext cx="8385120" cy="477000"/>
           </a:xfrm>
           <a:prstGeom prst="rect">
             <a:avLst/>
@@ -6965,7 +6928,7 @@
         <p:spPr>
           <a:xfrm>
             <a:off x="504000" y="1340640"/>
-            <a:ext cx="8097120" cy="5397840"/>
+            <a:ext cx="8096760" cy="5397480"/>
           </a:xfrm>
           <a:prstGeom prst="rect">
             <a:avLst/>
@@ -6986,7 +6949,7 @@
             <a:noAutofit/>
           </a:bodyPr>
           <a:p>
-            <a:pPr lvl="1" marL="360000" indent="-357120">
+            <a:pPr lvl="1" marL="360000" indent="-356760">
               <a:lnSpc>
                 <a:spcPct val="100000"/>
               </a:lnSpc>
@@ -7013,7 +6976,7 @@
             </a:endParaRPr>
           </a:p>
           <a:p>
-            <a:pPr lvl="1" marL="360000" indent="-357120">
+            <a:pPr lvl="1" marL="360000" indent="-356760">
               <a:lnSpc>
                 <a:spcPct val="100000"/>
               </a:lnSpc>
@@ -7040,7 +7003,7 @@
             </a:endParaRPr>
           </a:p>
           <a:p>
-            <a:pPr lvl="2" marL="648000" indent="-215280">
+            <a:pPr lvl="2" marL="648000" indent="-214920">
               <a:lnSpc>
                 <a:spcPct val="100000"/>
               </a:lnSpc>
@@ -7610,7 +7573,7 @@
         <p:spPr>
           <a:xfrm>
             <a:off x="4846320" y="3657600"/>
-            <a:ext cx="3664080" cy="1369440"/>
+            <a:ext cx="3663720" cy="1369080"/>
           </a:xfrm>
           <a:prstGeom prst="rect">
             <a:avLst/>
@@ -7775,7 +7738,7 @@
         <p:spPr>
           <a:xfrm>
             <a:off x="958680" y="4960800"/>
-            <a:ext cx="3704040" cy="1713600"/>
+            <a:ext cx="3703680" cy="1713240"/>
           </a:xfrm>
           <a:prstGeom prst="rect">
             <a:avLst/>
@@ -7819,7 +7782,7 @@
         <p:spPr>
           <a:xfrm>
             <a:off x="504000" y="404640"/>
-            <a:ext cx="8385480" cy="477360"/>
+            <a:ext cx="8385120" cy="477000"/>
           </a:xfrm>
           <a:prstGeom prst="rect">
             <a:avLst/>
@@ -7880,7 +7843,7 @@
         <p:spPr>
           <a:xfrm>
             <a:off x="504000" y="1340640"/>
-            <a:ext cx="8097120" cy="5397840"/>
+            <a:ext cx="8096760" cy="5397480"/>
           </a:xfrm>
           <a:prstGeom prst="rect">
             <a:avLst/>
@@ -7901,7 +7864,7 @@
             <a:noAutofit/>
           </a:bodyPr>
           <a:p>
-            <a:pPr lvl="1" marL="360000" indent="-357120">
+            <a:pPr lvl="1" marL="360000" indent="-356760">
               <a:lnSpc>
                 <a:spcPct val="100000"/>
               </a:lnSpc>
@@ -7928,7 +7891,7 @@
             </a:endParaRPr>
           </a:p>
           <a:p>
-            <a:pPr lvl="1" marL="360000" indent="-357120">
+            <a:pPr lvl="1" marL="360000" indent="-356760">
               <a:lnSpc>
                 <a:spcPct val="100000"/>
               </a:lnSpc>
@@ -7955,7 +7918,7 @@
             </a:endParaRPr>
           </a:p>
           <a:p>
-            <a:pPr lvl="2" marL="648000" indent="-215280">
+            <a:pPr lvl="2" marL="648000" indent="-214920">
               <a:lnSpc>
                 <a:spcPct val="100000"/>
               </a:lnSpc>
@@ -7984,7 +7947,7 @@
             </a:endParaRPr>
           </a:p>
           <a:p>
-            <a:pPr lvl="2" marL="648000" indent="-215280">
+            <a:pPr lvl="2" marL="648000" indent="-214920">
               <a:lnSpc>
                 <a:spcPct val="100000"/>
               </a:lnSpc>
@@ -8013,7 +7976,7 @@
             </a:endParaRPr>
           </a:p>
           <a:p>
-            <a:pPr lvl="2" marL="648000" indent="-215280">
+            <a:pPr lvl="2" marL="648000" indent="-214920">
               <a:lnSpc>
                 <a:spcPct val="100000"/>
               </a:lnSpc>
@@ -8116,7 +8079,7 @@
         <p:spPr>
           <a:xfrm>
             <a:off x="504000" y="404640"/>
-            <a:ext cx="8385480" cy="477360"/>
+            <a:ext cx="8385120" cy="477000"/>
           </a:xfrm>
           <a:prstGeom prst="rect">
             <a:avLst/>
@@ -8160,7 +8123,7 @@
                 <a:latin typeface="Arial"/>
                 <a:ea typeface="DejaVu Sans"/>
               </a:rPr>
-              <a:t>computing enrichment</a:t>
+              <a:t>GSEA</a:t>
             </a:r>
             <a:endParaRPr b="0" lang="en-US" sz="2800" spc="-1" strike="noStrike">
               <a:latin typeface="Arial"/>
@@ -8181,7 +8144,7 @@
         <p:spPr>
           <a:xfrm>
             <a:off x="156600" y="1084320"/>
-            <a:ext cx="7980840" cy="5132880"/>
+            <a:ext cx="7980480" cy="5132520"/>
           </a:xfrm>
           <a:prstGeom prst="rect">
             <a:avLst/>
@@ -8191,77 +8154,6 @@
           </a:ln>
         </p:spPr>
       </p:pic>
-      <p:sp>
-        <p:nvSpPr>
-          <p:cNvPr id="183" name="CustomShape 2"/>
-          <p:cNvSpPr/>
-          <p:nvPr/>
-        </p:nvSpPr>
-        <p:spPr>
-          <a:xfrm>
-            <a:off x="638280" y="6309360"/>
-            <a:ext cx="7749720" cy="529920"/>
-          </a:xfrm>
-          <a:prstGeom prst="rect">
-            <a:avLst/>
-          </a:prstGeom>
-          <a:noFill/>
-          <a:ln>
-            <a:noFill/>
-          </a:ln>
-        </p:spPr>
-        <p:style>
-          <a:lnRef idx="0"/>
-          <a:fillRef idx="0"/>
-          <a:effectRef idx="0"/>
-          <a:fontRef idx="minor"/>
-        </p:style>
-        <p:txBody>
-          <a:bodyPr lIns="90000" rIns="90000" tIns="45000" bIns="45000">
-            <a:noAutofit/>
-          </a:bodyPr>
-          <a:p>
-            <a:pPr>
-              <a:lnSpc>
-                <a:spcPct val="100000"/>
-              </a:lnSpc>
-            </a:pPr>
-            <a:r>
-              <a:rPr b="0" lang="en-US" sz="1800" spc="-1" strike="noStrike">
-                <a:solidFill>
-                  <a:srgbClr val="000000"/>
-                </a:solidFill>
-                <a:latin typeface="Arial"/>
-                <a:ea typeface="DejaVu Sans"/>
-              </a:rPr>
-              <a:t>Enrichment Score visualized using functions from the R package enrichplot</a:t>
-            </a:r>
-            <a:endParaRPr b="0" lang="en-US" sz="1800" spc="-1" strike="noStrike">
-              <a:latin typeface="Arial"/>
-            </a:endParaRPr>
-          </a:p>
-          <a:p>
-            <a:pPr>
-              <a:lnSpc>
-                <a:spcPct val="100000"/>
-              </a:lnSpc>
-            </a:pPr>
-            <a:r>
-              <a:rPr b="0" lang="en-US" sz="1300" spc="-1" strike="noStrike">
-                <a:solidFill>
-                  <a:srgbClr val="000000"/>
-                </a:solidFill>
-                <a:latin typeface="Arial"/>
-                <a:ea typeface="DejaVu Sans"/>
-              </a:rPr>
-              <a:t>http://www.bioconductor.org/packages/release/bioc/html/enrichplot.html</a:t>
-            </a:r>
-            <a:endParaRPr b="0" lang="en-US" sz="1300" spc="-1" strike="noStrike">
-              <a:latin typeface="Arial"/>
-            </a:endParaRPr>
-          </a:p>
-        </p:txBody>
-      </p:sp>
     </p:spTree>
   </p:cSld>
   <p:transition spd="med">
@@ -8289,14 +8181,14 @@
       </p:grpSpPr>
       <p:sp>
         <p:nvSpPr>
-          <p:cNvPr id="184" name="CustomShape 1"/>
+          <p:cNvPr id="183" name="CustomShape 1"/>
           <p:cNvSpPr/>
           <p:nvPr/>
         </p:nvSpPr>
         <p:spPr>
           <a:xfrm>
             <a:off x="504000" y="404640"/>
-            <a:ext cx="8385480" cy="477360"/>
+            <a:ext cx="8385120" cy="477000"/>
           </a:xfrm>
           <a:prstGeom prst="rect">
             <a:avLst/>
@@ -8330,7 +8222,37 @@
                 <a:latin typeface="Arial"/>
                 <a:ea typeface="DejaVu Sans"/>
               </a:rPr>
-              <a:t>Enrichment analysis – </a:t>
+              <a:t>Enrich</a:t>
+            </a:r>
+            <a:r>
+              <a:rPr b="0" lang="en-US" sz="3200" spc="-1" strike="noStrike">
+                <a:solidFill>
+                  <a:srgbClr val="323232"/>
+                </a:solidFill>
+                <a:latin typeface="Arial"/>
+                <a:ea typeface="DejaVu Sans"/>
+              </a:rPr>
+              <a:t>ment </a:t>
+            </a:r>
+            <a:r>
+              <a:rPr b="0" lang="en-US" sz="3200" spc="-1" strike="noStrike">
+                <a:solidFill>
+                  <a:srgbClr val="323232"/>
+                </a:solidFill>
+                <a:latin typeface="Arial"/>
+                <a:ea typeface="DejaVu Sans"/>
+              </a:rPr>
+              <a:t>analysis </a:t>
+            </a:r>
+            <a:r>
+              <a:rPr b="0" lang="en-US" sz="3200" spc="-1" strike="noStrike">
+                <a:solidFill>
+                  <a:srgbClr val="323232"/>
+                </a:solidFill>
+                <a:latin typeface="Arial"/>
+                <a:ea typeface="DejaVu Sans"/>
+              </a:rPr>
+              <a:t>– </a:t>
             </a:r>
             <a:r>
               <a:rPr b="0" lang="en-US" sz="2800" spc="-1" strike="noStrike">
@@ -8340,7 +8262,7 @@
                 <a:latin typeface="Arial"/>
                 <a:ea typeface="DejaVu Sans"/>
               </a:rPr>
-              <a:t>computing enrichment</a:t>
+              <a:t>ES</a:t>
             </a:r>
             <a:endParaRPr b="0" lang="en-US" sz="2800" spc="-1" strike="noStrike">
               <a:latin typeface="Arial"/>
@@ -8348,6 +8270,29 @@
           </a:p>
         </p:txBody>
       </p:sp>
+      <p:pic>
+        <p:nvPicPr>
+          <p:cNvPr id="184" name="" descr=""/>
+          <p:cNvPicPr/>
+          <p:nvPr/>
+        </p:nvPicPr>
+        <p:blipFill>
+          <a:blip r:embed="rId1"/>
+          <a:stretch/>
+        </p:blipFill>
+        <p:spPr>
+          <a:xfrm>
+            <a:off x="156600" y="1084320"/>
+            <a:ext cx="7980480" cy="5132520"/>
+          </a:xfrm>
+          <a:prstGeom prst="rect">
+            <a:avLst/>
+          </a:prstGeom>
+          <a:ln>
+            <a:noFill/>
+          </a:ln>
+        </p:spPr>
+      </p:pic>
       <p:sp>
         <p:nvSpPr>
           <p:cNvPr id="185" name="CustomShape 2"/>
@@ -8356,15 +8301,18 @@
         </p:nvSpPr>
         <p:spPr>
           <a:xfrm>
-            <a:off x="504000" y="1340640"/>
-            <a:ext cx="8097120" cy="5397840"/>
-          </a:xfrm>
-          <a:prstGeom prst="rect">
+            <a:off x="1554480" y="3566160"/>
+            <a:ext cx="274320" cy="274320"/>
+          </a:xfrm>
+          <a:prstGeom prst="ellipse">
             <a:avLst/>
           </a:prstGeom>
           <a:noFill/>
-          <a:ln>
-            <a:noFill/>
+          <a:ln w="38160">
+            <a:solidFill>
+              <a:srgbClr val="ff0000"/>
+            </a:solidFill>
+            <a:round/>
           </a:ln>
         </p:spPr>
         <p:style>
@@ -8373,266 +8321,154 @@
           <a:effectRef idx="0"/>
           <a:fontRef idx="minor"/>
         </p:style>
-        <p:txBody>
-          <a:bodyPr lIns="0" rIns="0" tIns="0" bIns="0">
+      </p:sp>
+      <p:sp>
+        <p:nvSpPr>
+          <p:cNvPr id="186" name="CustomShape 3"/>
+          <p:cNvSpPr/>
+          <p:nvPr/>
+        </p:nvSpPr>
+        <p:spPr>
+          <a:xfrm>
+            <a:off x="2531520" y="3585600"/>
+            <a:ext cx="274320" cy="274320"/>
+          </a:xfrm>
+          <a:prstGeom prst="ellipse">
+            <a:avLst/>
+          </a:prstGeom>
+          <a:noFill/>
+          <a:ln w="38160">
+            <a:solidFill>
+              <a:srgbClr val="00a933"/>
+            </a:solidFill>
+            <a:round/>
+          </a:ln>
+        </p:spPr>
+        <p:style>
+          <a:lnRef idx="0"/>
+          <a:fillRef idx="0"/>
+          <a:effectRef idx="0"/>
+          <a:fontRef idx="minor"/>
+        </p:style>
+      </p:sp>
+      <p:sp>
+        <p:nvSpPr>
+          <p:cNvPr id="187" name="TextShape 4"/>
+          <p:cNvSpPr txBox="1"/>
+          <p:nvPr/>
+        </p:nvSpPr>
+        <p:spPr>
+          <a:xfrm>
+            <a:off x="3840480" y="1554480"/>
+            <a:ext cx="4048560" cy="346320"/>
+          </a:xfrm>
+          <a:prstGeom prst="rect">
+            <a:avLst/>
+          </a:prstGeom>
+          <a:noFill/>
+          <a:ln>
+            <a:noFill/>
+          </a:ln>
+        </p:spPr>
+        <p:txBody>
+          <a:bodyPr lIns="90000" rIns="90000" tIns="45000" bIns="45000">
             <a:noAutofit/>
           </a:bodyPr>
           <a:p>
-            <a:pPr lvl="1" marL="360000" indent="-357120">
-              <a:lnSpc>
-                <a:spcPct val="100000"/>
-              </a:lnSpc>
-              <a:spcBef>
-                <a:spcPts val="2401"/>
-              </a:spcBef>
-              <a:buSzPct val="100000"/>
-              <a:buBlip>
-                <a:blip r:embed="rId1"/>
-              </a:buBlip>
-            </a:pPr>
-            <a:r>
-              <a:rPr b="1" lang="en-US" sz="2400" spc="-1" strike="noStrike">
+            <a:r>
+              <a:rPr b="0" lang="en-US" sz="1800" spc="-1" strike="noStrike">
+                <a:latin typeface="Arial"/>
+              </a:rPr>
+              <a:t>Going through the list of ranked genes</a:t>
+            </a:r>
+            <a:endParaRPr b="0" lang="en-US" sz="1800" spc="-1" strike="noStrike">
+              <a:latin typeface="Arial"/>
+            </a:endParaRPr>
+          </a:p>
+        </p:txBody>
+      </p:sp>
+      <p:sp>
+        <p:nvSpPr>
+          <p:cNvPr id="188" name="TextShape 5"/>
+          <p:cNvSpPr txBox="1"/>
+          <p:nvPr/>
+        </p:nvSpPr>
+        <p:spPr>
+          <a:xfrm>
+            <a:off x="809280" y="2326680"/>
+            <a:ext cx="4170600" cy="858240"/>
+          </a:xfrm>
+          <a:prstGeom prst="rect">
+            <a:avLst/>
+          </a:prstGeom>
+          <a:noFill/>
+          <a:ln>
+            <a:noFill/>
+          </a:ln>
+        </p:spPr>
+        <p:txBody>
+          <a:bodyPr lIns="90000" rIns="90000" tIns="45000" bIns="45000">
+            <a:noAutofit/>
+          </a:bodyPr>
+          <a:p>
+            <a:r>
+              <a:rPr b="0" lang="en-US" sz="1800" spc="-1" strike="noStrike">
+                <a:latin typeface="Arial"/>
+              </a:rPr>
+              <a:t>Gene :</a:t>
+            </a:r>
+            <a:endParaRPr b="0" lang="en-US" sz="1800" spc="-1" strike="noStrike">
+              <a:latin typeface="Arial"/>
+            </a:endParaRPr>
+          </a:p>
+          <a:p>
+            <a:r>
+              <a:rPr b="0" lang="en-US" sz="1800" spc="-1" strike="noStrike">
                 <a:solidFill>
-                  <a:srgbClr val="323232"/>
+                  <a:srgbClr val="ff0000"/>
                 </a:solidFill>
                 <a:latin typeface="Arial"/>
-                <a:ea typeface="DejaVu Sans"/>
-              </a:rPr>
-              <a:t>Many more methods or implementations:</a:t>
-            </a:r>
-            <a:endParaRPr b="0" lang="en-US" sz="2400" spc="-1" strike="noStrike">
-              <a:latin typeface="Arial"/>
-            </a:endParaRPr>
-          </a:p>
-          <a:p>
-            <a:pPr lvl="1" marL="360000" indent="-357120">
-              <a:lnSpc>
-                <a:spcPct val="100000"/>
-              </a:lnSpc>
-              <a:spcBef>
-                <a:spcPts val="2401"/>
-              </a:spcBef>
-              <a:buSzPct val="100000"/>
-              <a:buBlip>
-                <a:blip r:embed="rId2"/>
-              </a:buBlip>
-            </a:pPr>
-            <a:r>
-              <a:rPr b="1" lang="en-US" sz="2400" spc="-1" strike="noStrike">
+              </a:rPr>
+              <a:t> </a:t>
+            </a:r>
+            <a:r>
+              <a:rPr b="0" lang="en-US" sz="1800" spc="-1" strike="noStrike">
                 <a:solidFill>
-                  <a:srgbClr val="323232"/>
+                  <a:srgbClr val="ff0000"/>
                 </a:solidFill>
                 <a:latin typeface="Arial"/>
-                <a:ea typeface="DejaVu Sans"/>
-              </a:rPr>
-              <a:t>Signaling Pathway Impact Analysis</a:t>
-            </a:r>
-            <a:endParaRPr b="0" lang="en-US" sz="2400" spc="-1" strike="noStrike">
-              <a:latin typeface="Arial"/>
-            </a:endParaRPr>
-          </a:p>
-          <a:p>
-            <a:pPr lvl="2" marL="648000" indent="-215280">
-              <a:lnSpc>
-                <a:spcPct val="100000"/>
-              </a:lnSpc>
-              <a:spcBef>
-                <a:spcPts val="2401"/>
-              </a:spcBef>
-              <a:buClr>
-                <a:srgbClr val="000000"/>
-              </a:buClr>
-              <a:buSzPct val="45000"/>
-              <a:buFont typeface="Wingdings" charset="2"/>
-              <a:buChar char=""/>
-            </a:pPr>
-            <a:r>
-              <a:rPr b="1" lang="en-US" sz="1800" spc="-1" strike="noStrike">
+              </a:rPr>
+              <a:t>* in set       → Move curve away from 0</a:t>
+            </a:r>
+            <a:endParaRPr b="0" lang="en-US" sz="1800" spc="-1" strike="noStrike">
+              <a:latin typeface="Arial"/>
+            </a:endParaRPr>
+          </a:p>
+          <a:p>
+            <a:pPr>
+              <a:lnSpc>
+                <a:spcPct val="100000"/>
+              </a:lnSpc>
+            </a:pPr>
+            <a:r>
+              <a:rPr b="0" lang="en-US" sz="1800" spc="-1" strike="noStrike">
                 <a:solidFill>
-                  <a:srgbClr val="323232"/>
+                  <a:srgbClr val="00a933"/>
                 </a:solidFill>
                 <a:latin typeface="Arial"/>
-                <a:ea typeface="DejaVu Sans"/>
-              </a:rPr>
-              <a:t>https://bioconductor.org/packages/release/bioc/html/SPIA.html</a:t>
+              </a:rPr>
+              <a:t> </a:t>
+            </a:r>
+            <a:r>
+              <a:rPr b="0" lang="en-US" sz="1800" spc="-1" strike="noStrike">
+                <a:solidFill>
+                  <a:srgbClr val="00a933"/>
+                </a:solidFill>
+                <a:latin typeface="Arial"/>
+              </a:rPr>
+              <a:t>* not in set → Move curve to 0</a:t>
             </a:r>
             <a:endParaRPr b="0" lang="en-US" sz="1800" spc="-1" strike="noStrike">
-              <a:latin typeface="Arial"/>
-            </a:endParaRPr>
-          </a:p>
-          <a:p>
-            <a:pPr lvl="1" marL="360000" indent="-357120">
-              <a:lnSpc>
-                <a:spcPct val="100000"/>
-              </a:lnSpc>
-              <a:spcBef>
-                <a:spcPts val="2401"/>
-              </a:spcBef>
-              <a:buSzPct val="100000"/>
-              <a:buBlip>
-                <a:blip r:embed="rId3"/>
-              </a:buBlip>
-            </a:pPr>
-            <a:r>
-              <a:rPr b="1" lang="en-US" sz="2400" spc="-1" strike="noStrike">
-                <a:solidFill>
-                  <a:srgbClr val="323232"/>
-                </a:solidFill>
-                <a:latin typeface="Arial"/>
-                <a:ea typeface="DejaVu Sans"/>
-              </a:rPr>
-              <a:t>ISMARA</a:t>
-            </a:r>
-            <a:endParaRPr b="0" lang="en-US" sz="2400" spc="-1" strike="noStrike">
-              <a:latin typeface="Arial"/>
-            </a:endParaRPr>
-          </a:p>
-          <a:p>
-            <a:pPr lvl="2" marL="648000" indent="-215280">
-              <a:lnSpc>
-                <a:spcPct val="100000"/>
-              </a:lnSpc>
-              <a:spcBef>
-                <a:spcPts val="2401"/>
-              </a:spcBef>
-              <a:buClr>
-                <a:srgbClr val="000000"/>
-              </a:buClr>
-              <a:buSzPct val="45000"/>
-              <a:buFont typeface="Wingdings" charset="2"/>
-              <a:buChar char=""/>
-            </a:pPr>
-            <a:r>
-              <a:rPr b="1" lang="en-US" sz="1800" spc="-1" strike="noStrike" u="sng">
-                <a:solidFill>
-                  <a:srgbClr val="575757"/>
-                </a:solidFill>
-                <a:uFillTx/>
-                <a:latin typeface="Arial"/>
-                <a:ea typeface="DejaVu Sans"/>
-                <a:hlinkClick r:id="rId4"/>
-              </a:rPr>
-              <a:t>https://ismara.unibas.ch/mara/</a:t>
-            </a:r>
-            <a:endParaRPr b="0" lang="en-US" sz="1800" spc="-1" strike="noStrike">
-              <a:latin typeface="Arial"/>
-            </a:endParaRPr>
-          </a:p>
-          <a:p>
-            <a:pPr>
-              <a:lnSpc>
-                <a:spcPct val="100000"/>
-              </a:lnSpc>
-              <a:spcBef>
-                <a:spcPts val="2401"/>
-              </a:spcBef>
-            </a:pPr>
-            <a:endParaRPr b="0" lang="en-US" sz="1800" spc="-1" strike="noStrike">
-              <a:latin typeface="Arial"/>
-            </a:endParaRPr>
-          </a:p>
-          <a:p>
-            <a:pPr lvl="1" marL="360000" indent="-357120">
-              <a:lnSpc>
-                <a:spcPct val="100000"/>
-              </a:lnSpc>
-              <a:spcBef>
-                <a:spcPts val="2401"/>
-              </a:spcBef>
-              <a:buSzPct val="100000"/>
-              <a:buBlip>
-                <a:blip r:embed="rId5"/>
-              </a:buBlip>
-            </a:pPr>
-            <a:r>
-              <a:rPr b="1" lang="en-US" sz="2400" spc="-1" strike="noStrike">
-                <a:solidFill>
-                  <a:srgbClr val="323232"/>
-                </a:solidFill>
-                <a:latin typeface="Arial"/>
-                <a:ea typeface="DejaVu Sans"/>
-              </a:rPr>
-              <a:t>...</a:t>
-            </a:r>
-            <a:endParaRPr b="0" lang="en-US" sz="2400" spc="-1" strike="noStrike">
-              <a:latin typeface="Arial"/>
-            </a:endParaRPr>
-          </a:p>
-          <a:p>
-            <a:pPr>
-              <a:lnSpc>
-                <a:spcPct val="100000"/>
-              </a:lnSpc>
-              <a:spcBef>
-                <a:spcPts val="2401"/>
-              </a:spcBef>
-            </a:pPr>
-            <a:endParaRPr b="0" lang="en-US" sz="2400" spc="-1" strike="noStrike">
-              <a:latin typeface="Arial"/>
-            </a:endParaRPr>
-          </a:p>
-          <a:p>
-            <a:pPr>
-              <a:lnSpc>
-                <a:spcPct val="100000"/>
-              </a:lnSpc>
-              <a:spcBef>
-                <a:spcPts val="2401"/>
-              </a:spcBef>
-            </a:pPr>
-            <a:endParaRPr b="0" lang="en-US" sz="2400" spc="-1" strike="noStrike">
-              <a:latin typeface="Arial"/>
-            </a:endParaRPr>
-          </a:p>
-          <a:p>
-            <a:pPr>
-              <a:lnSpc>
-                <a:spcPct val="100000"/>
-              </a:lnSpc>
-              <a:spcBef>
-                <a:spcPts val="2401"/>
-              </a:spcBef>
-            </a:pPr>
-            <a:endParaRPr b="0" lang="en-US" sz="2400" spc="-1" strike="noStrike">
-              <a:latin typeface="Arial"/>
-            </a:endParaRPr>
-          </a:p>
-          <a:p>
-            <a:pPr>
-              <a:lnSpc>
-                <a:spcPct val="100000"/>
-              </a:lnSpc>
-              <a:spcBef>
-                <a:spcPts val="2401"/>
-              </a:spcBef>
-            </a:pPr>
-            <a:endParaRPr b="0" lang="en-US" sz="2400" spc="-1" strike="noStrike">
-              <a:latin typeface="Arial"/>
-            </a:endParaRPr>
-          </a:p>
-          <a:p>
-            <a:pPr>
-              <a:lnSpc>
-                <a:spcPct val="100000"/>
-              </a:lnSpc>
-              <a:spcBef>
-                <a:spcPts val="2401"/>
-              </a:spcBef>
-            </a:pPr>
-            <a:endParaRPr b="0" lang="en-US" sz="2400" spc="-1" strike="noStrike">
-              <a:latin typeface="Arial"/>
-            </a:endParaRPr>
-          </a:p>
-          <a:p>
-            <a:pPr>
-              <a:lnSpc>
-                <a:spcPct val="100000"/>
-              </a:lnSpc>
-              <a:spcBef>
-                <a:spcPts val="2401"/>
-              </a:spcBef>
-            </a:pPr>
-            <a:endParaRPr b="0" lang="en-US" sz="2400" spc="-1" strike="noStrike">
               <a:latin typeface="Arial"/>
             </a:endParaRPr>
           </a:p>
@@ -8665,14 +8501,14 @@
       </p:grpSpPr>
       <p:sp>
         <p:nvSpPr>
-          <p:cNvPr id="186" name="CustomShape 1"/>
+          <p:cNvPr id="189" name="CustomShape 1"/>
           <p:cNvSpPr/>
           <p:nvPr/>
         </p:nvSpPr>
         <p:spPr>
           <a:xfrm>
             <a:off x="504000" y="404640"/>
-            <a:ext cx="8385480" cy="477360"/>
+            <a:ext cx="8385120" cy="477000"/>
           </a:xfrm>
           <a:prstGeom prst="rect">
             <a:avLst/>
@@ -8706,31 +8542,66 @@
                 <a:latin typeface="Arial"/>
                 <a:ea typeface="DejaVu Sans"/>
               </a:rPr>
-              <a:t>Practical</a:t>
-            </a:r>
-            <a:endParaRPr b="0" lang="en-US" sz="3200" spc="-1" strike="noStrike">
-              <a:latin typeface="Arial"/>
-            </a:endParaRPr>
-          </a:p>
-        </p:txBody>
-      </p:sp>
-      <p:sp>
-        <p:nvSpPr>
-          <p:cNvPr id="187" name="CustomShape 2"/>
+              <a:t>Enrichment analysis – </a:t>
+            </a:r>
+            <a:r>
+              <a:rPr b="0" lang="en-US" sz="2800" spc="-1" strike="noStrike">
+                <a:solidFill>
+                  <a:srgbClr val="323232"/>
+                </a:solidFill>
+                <a:latin typeface="Arial"/>
+                <a:ea typeface="DejaVu Sans"/>
+              </a:rPr>
+              <a:t>ES</a:t>
+            </a:r>
+            <a:endParaRPr b="0" lang="en-US" sz="2800" spc="-1" strike="noStrike">
+              <a:latin typeface="Arial"/>
+            </a:endParaRPr>
+          </a:p>
+        </p:txBody>
+      </p:sp>
+      <p:pic>
+        <p:nvPicPr>
+          <p:cNvPr id="190" name="" descr=""/>
+          <p:cNvPicPr/>
+          <p:nvPr/>
+        </p:nvPicPr>
+        <p:blipFill>
+          <a:blip r:embed="rId1"/>
+          <a:stretch/>
+        </p:blipFill>
+        <p:spPr>
+          <a:xfrm>
+            <a:off x="156600" y="1084320"/>
+            <a:ext cx="7980480" cy="5132520"/>
+          </a:xfrm>
+          <a:prstGeom prst="rect">
+            <a:avLst/>
+          </a:prstGeom>
+          <a:ln>
+            <a:noFill/>
+          </a:ln>
+        </p:spPr>
+      </p:pic>
+      <p:sp>
+        <p:nvSpPr>
+          <p:cNvPr id="191" name="Line 2"/>
           <p:cNvSpPr/>
           <p:nvPr/>
         </p:nvSpPr>
         <p:spPr>
           <a:xfrm>
-            <a:off x="504000" y="1340640"/>
-            <a:ext cx="8097120" cy="5397840"/>
-          </a:xfrm>
-          <a:prstGeom prst="rect">
-            <a:avLst/>
-          </a:prstGeom>
-          <a:noFill/>
-          <a:ln>
-            <a:noFill/>
+            <a:off x="1737360" y="1554480"/>
+            <a:ext cx="0" cy="2834640"/>
+          </a:xfrm>
+          <a:prstGeom prst="line">
+            <a:avLst/>
+          </a:prstGeom>
+          <a:ln w="38160">
+            <a:solidFill>
+              <a:srgbClr val="3465a4"/>
+            </a:solidFill>
+            <a:round/>
           </a:ln>
         </p:spPr>
         <p:style>
@@ -8739,47 +8610,154 @@
           <a:effectRef idx="0"/>
           <a:fontRef idx="minor"/>
         </p:style>
-        <p:txBody>
-          <a:bodyPr lIns="0" rIns="0" tIns="0" bIns="0">
+      </p:sp>
+      <p:sp>
+        <p:nvSpPr>
+          <p:cNvPr id="192" name="TextShape 3"/>
+          <p:cNvSpPr txBox="1"/>
+          <p:nvPr/>
+        </p:nvSpPr>
+        <p:spPr>
+          <a:xfrm>
+            <a:off x="2630880" y="1371600"/>
+            <a:ext cx="4318560" cy="346320"/>
+          </a:xfrm>
+          <a:prstGeom prst="rect">
+            <a:avLst/>
+          </a:prstGeom>
+          <a:noFill/>
+          <a:ln>
+            <a:noFill/>
+          </a:ln>
+        </p:spPr>
+        <p:txBody>
+          <a:bodyPr lIns="90000" rIns="90000" tIns="45000" bIns="45000">
             <a:noAutofit/>
           </a:bodyPr>
           <a:p>
-            <a:pPr lvl="1" marL="360000" indent="-357120">
-              <a:lnSpc>
-                <a:spcPct val="100000"/>
-              </a:lnSpc>
-              <a:spcBef>
-                <a:spcPts val="2401"/>
-              </a:spcBef>
-              <a:buSzPct val="100000"/>
-              <a:buBlip>
-                <a:blip r:embed="rId1"/>
-              </a:buBlip>
-            </a:pPr>
-            <a:r>
-              <a:rPr b="1" lang="en-US" sz="2400" spc="-1" strike="noStrike">
-                <a:solidFill>
-                  <a:srgbClr val="323232"/>
-                </a:solidFill>
-                <a:latin typeface="Arial"/>
-                <a:ea typeface="DejaVu Sans"/>
-              </a:rPr>
-              <a:t>Go to the website and follow the Enrichment practical</a:t>
-            </a:r>
-            <a:endParaRPr b="0" lang="en-US" sz="2400" spc="-1" strike="noStrike">
-              <a:latin typeface="Arial"/>
-            </a:endParaRPr>
-          </a:p>
-          <a:p>
-            <a:pPr>
-              <a:lnSpc>
-                <a:spcPct val="100000"/>
-              </a:lnSpc>
-              <a:spcBef>
-                <a:spcPts val="2401"/>
-              </a:spcBef>
-            </a:pPr>
-            <a:endParaRPr b="0" lang="en-US" sz="2400" spc="-1" strike="noStrike">
+            <a:r>
+              <a:rPr b="0" lang="en-US" sz="1800" spc="-1" strike="noStrike">
+                <a:latin typeface="Arial"/>
+              </a:rPr>
+              <a:t>Enrichment Score (ES) : curve maximum</a:t>
+            </a:r>
+            <a:endParaRPr b="0" lang="en-US" sz="1800" spc="-1" strike="noStrike">
+              <a:latin typeface="Arial"/>
+            </a:endParaRPr>
+          </a:p>
+        </p:txBody>
+      </p:sp>
+      <p:sp>
+        <p:nvSpPr>
+          <p:cNvPr id="193" name="Line 4"/>
+          <p:cNvSpPr/>
+          <p:nvPr/>
+        </p:nvSpPr>
+        <p:spPr>
+          <a:xfrm flipH="1">
+            <a:off x="1737360" y="1554480"/>
+            <a:ext cx="893520" cy="0"/>
+          </a:xfrm>
+          <a:prstGeom prst="line">
+            <a:avLst/>
+          </a:prstGeom>
+          <a:ln>
+            <a:solidFill>
+              <a:srgbClr val="3465a4"/>
+            </a:solidFill>
+            <a:tailEnd len="med" type="triangle" w="med"/>
+          </a:ln>
+        </p:spPr>
+        <p:style>
+          <a:lnRef idx="0"/>
+          <a:fillRef idx="0"/>
+          <a:effectRef idx="0"/>
+          <a:fontRef idx="minor"/>
+        </p:style>
+      </p:sp>
+      <p:sp>
+        <p:nvSpPr>
+          <p:cNvPr id="194" name="CustomShape 5"/>
+          <p:cNvSpPr/>
+          <p:nvPr/>
+        </p:nvSpPr>
+        <p:spPr>
+          <a:xfrm>
+            <a:off x="731520" y="2615760"/>
+            <a:ext cx="1005840" cy="1554480"/>
+          </a:xfrm>
+          <a:prstGeom prst="rect">
+            <a:avLst/>
+          </a:prstGeom>
+          <a:solidFill>
+            <a:srgbClr val="ff8000">
+              <a:alpha val="50000"/>
+            </a:srgbClr>
+          </a:solidFill>
+          <a:ln>
+            <a:noFill/>
+          </a:ln>
+        </p:spPr>
+        <p:style>
+          <a:lnRef idx="0"/>
+          <a:fillRef idx="0"/>
+          <a:effectRef idx="0"/>
+          <a:fontRef idx="minor"/>
+        </p:style>
+      </p:sp>
+      <p:sp>
+        <p:nvSpPr>
+          <p:cNvPr id="195" name="TextShape 6"/>
+          <p:cNvSpPr txBox="1"/>
+          <p:nvPr/>
+        </p:nvSpPr>
+        <p:spPr>
+          <a:xfrm>
+            <a:off x="747360" y="2651760"/>
+            <a:ext cx="990000" cy="858240"/>
+          </a:xfrm>
+          <a:prstGeom prst="rect">
+            <a:avLst/>
+          </a:prstGeom>
+          <a:noFill/>
+          <a:ln>
+            <a:noFill/>
+          </a:ln>
+        </p:spPr>
+        <p:txBody>
+          <a:bodyPr lIns="90000" rIns="90000" tIns="45000" bIns="45000">
+            <a:noAutofit/>
+          </a:bodyPr>
+          <a:p>
+            <a:r>
+              <a:rPr b="0" lang="en-US" sz="1800" spc="-1" strike="noStrike">
+                <a:latin typeface="Arial"/>
+              </a:rPr>
+              <a:t>Leading</a:t>
+            </a:r>
+            <a:endParaRPr b="0" lang="en-US" sz="1800" spc="-1" strike="noStrike">
+              <a:latin typeface="Arial"/>
+            </a:endParaRPr>
+          </a:p>
+          <a:p>
+            <a:r>
+              <a:rPr b="0" lang="en-US" sz="1800" spc="-1" strike="noStrike">
+                <a:latin typeface="Arial"/>
+              </a:rPr>
+              <a:t>Edge </a:t>
+            </a:r>
+            <a:endParaRPr b="0" lang="en-US" sz="1800" spc="-1" strike="noStrike">
+              <a:latin typeface="Arial"/>
+            </a:endParaRPr>
+          </a:p>
+          <a:p>
+            <a:r>
+              <a:rPr b="0" lang="en-US" sz="1800" spc="-1" strike="noStrike">
+                <a:latin typeface="Arial"/>
+              </a:rPr>
+              <a:t>genes</a:t>
+            </a:r>
+            <a:endParaRPr b="0" lang="en-US" sz="1800" spc="-1" strike="noStrike">
               <a:latin typeface="Arial"/>
             </a:endParaRPr>
           </a:p>
@@ -8812,14 +8790,14 @@
       </p:grpSpPr>
       <p:sp>
         <p:nvSpPr>
-          <p:cNvPr id="188" name="CustomShape 1"/>
+          <p:cNvPr id="196" name="CustomShape 1"/>
           <p:cNvSpPr/>
           <p:nvPr/>
         </p:nvSpPr>
         <p:spPr>
           <a:xfrm>
-            <a:off x="504000" y="3933000"/>
-            <a:ext cx="8097120" cy="2161440"/>
+            <a:off x="504000" y="404640"/>
+            <a:ext cx="8385120" cy="477000"/>
           </a:xfrm>
           <a:prstGeom prst="rect">
             <a:avLst/>
@@ -8837,7 +8815,7 @@
         </p:style>
         <p:txBody>
           <a:bodyPr lIns="0" rIns="0" tIns="0" bIns="0" anchor="ctr">
-            <a:normAutofit fontScale="60000"/>
+            <a:normAutofit/>
           </a:bodyPr>
           <a:p>
             <a:pPr>
@@ -8846,74 +8824,26 @@
               </a:lnSpc>
             </a:pPr>
             <a:r>
-              <a:rPr b="1" lang="en-US" sz="4000" spc="-1" strike="noStrike">
+              <a:rPr b="0" lang="en-US" sz="3200" spc="-1" strike="noStrike">
                 <a:solidFill>
-                  <a:srgbClr val="e30613"/>
+                  <a:srgbClr val="323232"/>
                 </a:solidFill>
                 <a:latin typeface="Arial"/>
                 <a:ea typeface="DejaVu Sans"/>
               </a:rPr>
-              <a:t>Contributors:</a:t>
-            </a:r>
-            <a:br/>
-            <a:br/>
-            <a:r>
-              <a:rPr b="1" lang="en-US" sz="2200" spc="-1" strike="noStrike">
+              <a:t>Enrichment analysis – </a:t>
+            </a:r>
+            <a:r>
+              <a:rPr b="0" lang="en-US" sz="2800" spc="-1" strike="noStrike">
                 <a:solidFill>
-                  <a:srgbClr val="e30613"/>
+                  <a:srgbClr val="323232"/>
                 </a:solidFill>
                 <a:latin typeface="Arial"/>
                 <a:ea typeface="DejaVu Sans"/>
               </a:rPr>
-              <a:t>Geoffrey Fucile</a:t>
-            </a:r>
-            <a:br/>
-            <a:r>
-              <a:rPr b="1" lang="en-US" sz="2200" spc="-1" strike="noStrike">
-                <a:solidFill>
-                  <a:srgbClr val="e30613"/>
-                </a:solidFill>
-                <a:latin typeface="Arial"/>
-                <a:ea typeface="DejaVu Sans"/>
-              </a:rPr>
-              <a:t>Walid Gharib</a:t>
-            </a:r>
-            <a:br/>
-            <a:r>
-              <a:rPr b="1" lang="en-US" sz="2200" spc="-1" strike="noStrike">
-                <a:solidFill>
-                  <a:srgbClr val="e30613"/>
-                </a:solidFill>
-                <a:latin typeface="Arial"/>
-                <a:ea typeface="DejaVu Sans"/>
-              </a:rPr>
-              <a:t>Irene Keller</a:t>
-            </a:r>
-            <a:br/>
-            <a:r>
-              <a:rPr b="1" lang="en-US" sz="2200" spc="-1" strike="noStrike">
-                <a:solidFill>
-                  <a:srgbClr val="e30613"/>
-                </a:solidFill>
-                <a:latin typeface="Arial"/>
-                <a:ea typeface="DejaVu Sans"/>
-              </a:rPr>
-              <a:t>Pablo Escobar Lopez</a:t>
-            </a:r>
-            <a:br/>
-            <a:r>
-              <a:rPr b="1" lang="en-US" sz="2200" spc="-1" strike="noStrike">
-                <a:solidFill>
-                  <a:srgbClr val="e30613"/>
-                </a:solidFill>
-                <a:latin typeface="Arial"/>
-                <a:ea typeface="DejaVu Sans"/>
-              </a:rPr>
-              <a:t>Charlotte Soneson</a:t>
-            </a:r>
-            <a:br/>
-            <a:br/>
-            <a:endParaRPr b="0" lang="en-US" sz="2200" spc="-1" strike="noStrike">
+              <a:t>NES</a:t>
+            </a:r>
+            <a:endParaRPr b="0" lang="en-US" sz="2800" spc="-1" strike="noStrike">
               <a:latin typeface="Arial"/>
             </a:endParaRPr>
           </a:p>
@@ -8921,19 +8851,18 @@
       </p:sp>
       <p:pic>
         <p:nvPicPr>
-          <p:cNvPr id="189" name="Espace réservé pour une image  17" descr=""/>
+          <p:cNvPr id="197" name="" descr=""/>
           <p:cNvPicPr/>
           <p:nvPr/>
         </p:nvPicPr>
         <p:blipFill>
           <a:blip r:embed="rId1"/>
-          <a:srcRect l="1467" t="0" r="1467" b="12793"/>
           <a:stretch/>
         </p:blipFill>
         <p:spPr>
           <a:xfrm>
-            <a:off x="0" y="0"/>
-            <a:ext cx="9141120" cy="3426120"/>
+            <a:off x="156600" y="1084320"/>
+            <a:ext cx="7980480" cy="5132520"/>
           </a:xfrm>
           <a:prstGeom prst="rect">
             <a:avLst/>
@@ -8945,94 +8874,230 @@
       </p:pic>
       <p:sp>
         <p:nvSpPr>
-          <p:cNvPr id="190" name="Line 2"/>
+          <p:cNvPr id="198" name="Line 2"/>
           <p:cNvSpPr/>
           <p:nvPr/>
         </p:nvSpPr>
         <p:spPr>
           <a:xfrm>
-            <a:off x="0" y="3424680"/>
-            <a:ext cx="9144000" cy="1440"/>
+            <a:off x="1737360" y="1554480"/>
+            <a:ext cx="0" cy="2834640"/>
           </a:xfrm>
           <a:prstGeom prst="line">
             <a:avLst/>
           </a:prstGeom>
-          <a:ln w="19080">
+          <a:ln w="38160">
             <a:solidFill>
-              <a:srgbClr val="e30613"/>
+              <a:srgbClr val="3465a4"/>
             </a:solidFill>
             <a:round/>
           </a:ln>
         </p:spPr>
         <p:style>
-          <a:lnRef idx="1">
-            <a:schemeClr val="accent6"/>
-          </a:lnRef>
-          <a:fillRef idx="0">
-            <a:schemeClr val="accent6"/>
-          </a:fillRef>
-          <a:effectRef idx="0">
-            <a:schemeClr val="accent6"/>
-          </a:effectRef>
+          <a:lnRef idx="0"/>
+          <a:fillRef idx="0"/>
+          <a:effectRef idx="0"/>
           <a:fontRef idx="minor"/>
         </p:style>
       </p:sp>
-      <p:pic>
-        <p:nvPicPr>
-          <p:cNvPr id="191" name="Picture 7" descr=""/>
-          <p:cNvPicPr/>
+      <p:sp>
+        <p:nvSpPr>
+          <p:cNvPr id="199" name="TextShape 3"/>
+          <p:cNvSpPr txBox="1"/>
           <p:nvPr/>
-        </p:nvPicPr>
-        <p:blipFill>
-          <a:blip r:embed="rId2"/>
-          <a:stretch/>
-        </p:blipFill>
-        <p:spPr>
-          <a:xfrm>
-            <a:off x="7448400" y="3286080"/>
-            <a:ext cx="1326240" cy="717120"/>
-          </a:xfrm>
-          <a:prstGeom prst="rect">
-            <a:avLst/>
-          </a:prstGeom>
+        </p:nvSpPr>
+        <p:spPr>
+          <a:xfrm>
+            <a:off x="2630880" y="1371600"/>
+            <a:ext cx="485640" cy="346320"/>
+          </a:xfrm>
+          <a:prstGeom prst="rect">
+            <a:avLst/>
+          </a:prstGeom>
+          <a:noFill/>
           <a:ln>
             <a:noFill/>
           </a:ln>
         </p:spPr>
-      </p:pic>
-      <p:sp>
-        <p:nvSpPr>
-          <p:cNvPr id="192" name="Line 3"/>
+        <p:txBody>
+          <a:bodyPr lIns="90000" rIns="90000" tIns="45000" bIns="45000">
+            <a:noAutofit/>
+          </a:bodyPr>
+          <a:p>
+            <a:r>
+              <a:rPr b="0" lang="en-US" sz="1800" spc="-1" strike="noStrike">
+                <a:latin typeface="Arial"/>
+              </a:rPr>
+              <a:t>ES</a:t>
+            </a:r>
+            <a:endParaRPr b="0" lang="en-US" sz="1800" spc="-1" strike="noStrike">
+              <a:latin typeface="Arial"/>
+            </a:endParaRPr>
+          </a:p>
+        </p:txBody>
+      </p:sp>
+      <p:sp>
+        <p:nvSpPr>
+          <p:cNvPr id="200" name="Line 4"/>
           <p:cNvSpPr/>
           <p:nvPr/>
         </p:nvSpPr>
         <p:spPr>
-          <a:xfrm>
-            <a:off x="0" y="-1440"/>
-            <a:ext cx="9144000" cy="1440"/>
+          <a:xfrm flipH="1">
+            <a:off x="1737360" y="1554480"/>
+            <a:ext cx="893520" cy="0"/>
           </a:xfrm>
           <a:prstGeom prst="line">
             <a:avLst/>
           </a:prstGeom>
-          <a:ln w="19080">
+          <a:ln>
             <a:solidFill>
-              <a:srgbClr val="e30613"/>
+              <a:srgbClr val="3465a4"/>
             </a:solidFill>
-            <a:round/>
+            <a:tailEnd len="med" type="triangle" w="med"/>
           </a:ln>
         </p:spPr>
         <p:style>
-          <a:lnRef idx="1">
-            <a:schemeClr val="accent6"/>
-          </a:lnRef>
-          <a:fillRef idx="0">
-            <a:schemeClr val="accent6"/>
-          </a:fillRef>
-          <a:effectRef idx="0">
-            <a:schemeClr val="accent6"/>
-          </a:effectRef>
+          <a:lnRef idx="0"/>
+          <a:fillRef idx="0"/>
+          <a:effectRef idx="0"/>
           <a:fontRef idx="minor"/>
         </p:style>
+      </p:sp>
+      <p:sp>
+        <p:nvSpPr>
+          <p:cNvPr id="201" name="TextShape 5"/>
+          <p:cNvSpPr txBox="1"/>
+          <p:nvPr/>
+        </p:nvSpPr>
+        <p:spPr>
+          <a:xfrm>
+            <a:off x="3898800" y="1371600"/>
+            <a:ext cx="5226840" cy="602280"/>
+          </a:xfrm>
+          <a:prstGeom prst="rect">
+            <a:avLst/>
+          </a:prstGeom>
+          <a:noFill/>
+          <a:ln>
+            <a:noFill/>
+          </a:ln>
+        </p:spPr>
+        <p:txBody>
+          <a:bodyPr lIns="90000" rIns="90000" tIns="45000" bIns="45000">
+            <a:noAutofit/>
+          </a:bodyPr>
+          <a:p>
+            <a:r>
+              <a:rPr b="1" lang="en-US" sz="1800" spc="-1" strike="noStrike">
+                <a:latin typeface="Arial"/>
+              </a:rPr>
+              <a:t>Subramanian et al. 2005 : </a:t>
+            </a:r>
+            <a:r>
+              <a:rPr b="0" lang="en-US" sz="1800" spc="-1" strike="noStrike">
+                <a:latin typeface="Arial"/>
+              </a:rPr>
+              <a:t>normalization </a:t>
+            </a:r>
+            <a:endParaRPr b="0" lang="en-US" sz="1800" spc="-1" strike="noStrike">
+              <a:latin typeface="Arial"/>
+            </a:endParaRPr>
+          </a:p>
+          <a:p>
+            <a:r>
+              <a:rPr b="0" lang="en-US" sz="1800" spc="-1" strike="noStrike">
+                <a:latin typeface="Arial"/>
+              </a:rPr>
+              <a:t>	</a:t>
+            </a:r>
+            <a:r>
+              <a:rPr b="0" lang="en-US" sz="1800" spc="-1" strike="noStrike">
+                <a:latin typeface="Arial"/>
+              </a:rPr>
+              <a:t>by comparison with gene-label permuted sets</a:t>
+            </a:r>
+            <a:endParaRPr b="0" lang="en-US" sz="1800" spc="-1" strike="noStrike">
+              <a:latin typeface="Arial"/>
+            </a:endParaRPr>
+          </a:p>
+        </p:txBody>
+      </p:sp>
+      <p:sp>
+        <p:nvSpPr>
+          <p:cNvPr id="202" name="TextShape 6"/>
+          <p:cNvSpPr txBox="1"/>
+          <p:nvPr/>
+        </p:nvSpPr>
+        <p:spPr>
+          <a:xfrm>
+            <a:off x="3899160" y="2091960"/>
+            <a:ext cx="5066640" cy="858240"/>
+          </a:xfrm>
+          <a:prstGeom prst="rect">
+            <a:avLst/>
+          </a:prstGeom>
+          <a:noFill/>
+          <a:ln>
+            <a:noFill/>
+          </a:ln>
+        </p:spPr>
+        <p:txBody>
+          <a:bodyPr lIns="90000" rIns="90000" tIns="45000" bIns="45000">
+            <a:noAutofit/>
+          </a:bodyPr>
+          <a:p>
+            <a:r>
+              <a:rPr b="1" lang="en-US" sz="1800" spc="-1" strike="noStrike">
+                <a:latin typeface="Arial"/>
+              </a:rPr>
+              <a:t>Korotkevich et al. 2021 : fGSEA</a:t>
+            </a:r>
+            <a:r>
+              <a:rPr b="0" lang="en-US" sz="1800" spc="-1" strike="noStrike">
+                <a:latin typeface="Arial"/>
+              </a:rPr>
+              <a:t>: normalization</a:t>
+            </a:r>
+            <a:endParaRPr b="0" lang="en-US" sz="1800" spc="-1" strike="noStrike">
+              <a:latin typeface="Arial"/>
+            </a:endParaRPr>
+          </a:p>
+          <a:p>
+            <a:r>
+              <a:rPr b="0" lang="en-US" sz="1800" spc="-1" strike="noStrike">
+                <a:latin typeface="Arial"/>
+              </a:rPr>
+              <a:t>      </a:t>
+            </a:r>
+            <a:r>
+              <a:rPr b="0" lang="en-US" sz="1800" spc="-1" strike="noStrike">
+                <a:latin typeface="Arial"/>
+              </a:rPr>
+              <a:t>With parallel evaluation + score heuristic +</a:t>
+            </a:r>
+            <a:endParaRPr b="0" lang="en-US" sz="1800" spc="-1" strike="noStrike">
+              <a:latin typeface="Arial"/>
+            </a:endParaRPr>
+          </a:p>
+          <a:p>
+            <a:r>
+              <a:rPr b="0" lang="en-US" sz="1800" spc="-1" strike="noStrike">
+                <a:latin typeface="Arial"/>
+              </a:rPr>
+              <a:t>      </a:t>
+            </a:r>
+            <a:r>
+              <a:rPr b="0" lang="en-US" sz="1800" spc="-1" strike="noStrike">
+                <a:latin typeface="Arial"/>
+              </a:rPr>
+              <a:t>Refinement of low-p-values</a:t>
+            </a:r>
+            <a:endParaRPr b="0" lang="en-US" sz="1800" spc="-1" strike="noStrike">
+              <a:latin typeface="Arial"/>
+            </a:endParaRPr>
+          </a:p>
+        </p:txBody>
       </p:sp>
     </p:spTree>
   </p:cSld>
@@ -9068,7 +9133,7 @@
         <p:spPr>
           <a:xfrm>
             <a:off x="504000" y="404640"/>
-            <a:ext cx="8385480" cy="477360"/>
+            <a:ext cx="8385120" cy="477000"/>
           </a:xfrm>
           <a:prstGeom prst="rect">
             <a:avLst/>
@@ -9119,7 +9184,7 @@
         <p:spPr>
           <a:xfrm>
             <a:off x="504000" y="1340640"/>
-            <a:ext cx="8097120" cy="5397840"/>
+            <a:ext cx="8096760" cy="5397480"/>
           </a:xfrm>
           <a:prstGeom prst="rect">
             <a:avLst/>
@@ -9140,7 +9205,7 @@
             <a:noAutofit/>
           </a:bodyPr>
           <a:p>
-            <a:pPr lvl="1" marL="360000" indent="-357120">
+            <a:pPr lvl="1" marL="360000" indent="-356760">
               <a:lnSpc>
                 <a:spcPct val="100000"/>
               </a:lnSpc>
@@ -9167,7 +9232,7 @@
             </a:endParaRPr>
           </a:p>
           <a:p>
-            <a:pPr lvl="1" marL="360000" indent="-357120">
+            <a:pPr lvl="1" marL="360000" indent="-356760">
               <a:lnSpc>
                 <a:spcPct val="100000"/>
               </a:lnSpc>
@@ -9194,7 +9259,884 @@
             </a:endParaRPr>
           </a:p>
           <a:p>
-            <a:pPr lvl="1" marL="360000" indent="-357120">
+            <a:pPr>
+              <a:lnSpc>
+                <a:spcPct val="100000"/>
+              </a:lnSpc>
+              <a:spcBef>
+                <a:spcPts val="2401"/>
+              </a:spcBef>
+            </a:pPr>
+            <a:endParaRPr b="0" lang="en-US" sz="2400" spc="-1" strike="noStrike">
+              <a:latin typeface="Arial"/>
+            </a:endParaRPr>
+          </a:p>
+        </p:txBody>
+      </p:sp>
+    </p:spTree>
+  </p:cSld>
+  <p:transition spd="med">
+    <p:fade/>
+  </p:transition>
+</p:sld>
+</file>
+
+<file path=ppt/slides/slide20.xml><?xml version="1.0" encoding="utf-8"?>
+<p:sld xmlns:a="http://schemas.openxmlformats.org/drawingml/2006/main" xmlns:p="http://schemas.openxmlformats.org/presentationml/2006/main" xmlns:r="http://schemas.openxmlformats.org/officeDocument/2006/relationships" xmlns:p14="http://schemas.microsoft.com/office/powerpoint/2010/main" xmlns:p15="http://schemas.microsoft.com/office/powerpoint/2012/main" xmlns:mc="http://schemas.openxmlformats.org/markup-compatibility/2006">
+  <p:cSld>
+    <p:spTree>
+      <p:nvGrpSpPr>
+        <p:cNvPr id="1" name=""/>
+        <p:cNvGrpSpPr/>
+        <p:nvPr/>
+      </p:nvGrpSpPr>
+      <p:grpSpPr>
+        <a:xfrm>
+          <a:off x="0" y="0"/>
+          <a:ext cx="0" cy="0"/>
+          <a:chOff x="0" y="0"/>
+          <a:chExt cx="0" cy="0"/>
+        </a:xfrm>
+      </p:grpSpPr>
+      <p:sp>
+        <p:nvSpPr>
+          <p:cNvPr id="203" name="CustomShape 1"/>
+          <p:cNvSpPr/>
+          <p:nvPr/>
+        </p:nvSpPr>
+        <p:spPr>
+          <a:xfrm>
+            <a:off x="504000" y="404640"/>
+            <a:ext cx="8385120" cy="477000"/>
+          </a:xfrm>
+          <a:prstGeom prst="rect">
+            <a:avLst/>
+          </a:prstGeom>
+          <a:noFill/>
+          <a:ln>
+            <a:noFill/>
+          </a:ln>
+        </p:spPr>
+        <p:style>
+          <a:lnRef idx="0"/>
+          <a:fillRef idx="0"/>
+          <a:effectRef idx="0"/>
+          <a:fontRef idx="minor"/>
+        </p:style>
+        <p:txBody>
+          <a:bodyPr lIns="0" rIns="0" tIns="0" bIns="0" anchor="ctr">
+            <a:normAutofit/>
+          </a:bodyPr>
+          <a:p>
+            <a:pPr>
+              <a:lnSpc>
+                <a:spcPct val="100000"/>
+              </a:lnSpc>
+            </a:pPr>
+            <a:r>
+              <a:rPr b="0" lang="en-US" sz="3200" spc="-1" strike="noStrike">
+                <a:solidFill>
+                  <a:srgbClr val="323232"/>
+                </a:solidFill>
+                <a:latin typeface="Arial"/>
+                <a:ea typeface="DejaVu Sans"/>
+              </a:rPr>
+              <a:t>Enrichment analysis – </a:t>
+            </a:r>
+            <a:r>
+              <a:rPr b="0" lang="en-US" sz="2800" spc="-1" strike="noStrike">
+                <a:solidFill>
+                  <a:srgbClr val="323232"/>
+                </a:solidFill>
+                <a:latin typeface="Arial"/>
+                <a:ea typeface="DejaVu Sans"/>
+              </a:rPr>
+              <a:t>(f)GSEA</a:t>
+            </a:r>
+            <a:endParaRPr b="0" lang="en-US" sz="2800" spc="-1" strike="noStrike">
+              <a:latin typeface="Arial"/>
+            </a:endParaRPr>
+          </a:p>
+        </p:txBody>
+      </p:sp>
+      <p:pic>
+        <p:nvPicPr>
+          <p:cNvPr id="204" name="" descr=""/>
+          <p:cNvPicPr/>
+          <p:nvPr/>
+        </p:nvPicPr>
+        <p:blipFill>
+          <a:blip r:embed="rId1"/>
+          <a:stretch/>
+        </p:blipFill>
+        <p:spPr>
+          <a:xfrm>
+            <a:off x="156600" y="1084320"/>
+            <a:ext cx="7980480" cy="5132520"/>
+          </a:xfrm>
+          <a:prstGeom prst="rect">
+            <a:avLst/>
+          </a:prstGeom>
+          <a:ln>
+            <a:noFill/>
+          </a:ln>
+        </p:spPr>
+      </p:pic>
+      <p:sp>
+        <p:nvSpPr>
+          <p:cNvPr id="205" name="Line 2"/>
+          <p:cNvSpPr/>
+          <p:nvPr/>
+        </p:nvSpPr>
+        <p:spPr>
+          <a:xfrm>
+            <a:off x="1737360" y="1554480"/>
+            <a:ext cx="0" cy="2834640"/>
+          </a:xfrm>
+          <a:prstGeom prst="line">
+            <a:avLst/>
+          </a:prstGeom>
+          <a:ln w="38160">
+            <a:solidFill>
+              <a:srgbClr val="3465a4"/>
+            </a:solidFill>
+            <a:round/>
+          </a:ln>
+        </p:spPr>
+        <p:style>
+          <a:lnRef idx="0"/>
+          <a:fillRef idx="0"/>
+          <a:effectRef idx="0"/>
+          <a:fontRef idx="minor"/>
+        </p:style>
+      </p:sp>
+      <p:sp>
+        <p:nvSpPr>
+          <p:cNvPr id="206" name="TextShape 3"/>
+          <p:cNvSpPr txBox="1"/>
+          <p:nvPr/>
+        </p:nvSpPr>
+        <p:spPr>
+          <a:xfrm>
+            <a:off x="2630880" y="1371600"/>
+            <a:ext cx="485640" cy="346320"/>
+          </a:xfrm>
+          <a:prstGeom prst="rect">
+            <a:avLst/>
+          </a:prstGeom>
+          <a:noFill/>
+          <a:ln>
+            <a:noFill/>
+          </a:ln>
+        </p:spPr>
+        <p:txBody>
+          <a:bodyPr lIns="90000" rIns="90000" tIns="45000" bIns="45000">
+            <a:noAutofit/>
+          </a:bodyPr>
+          <a:p>
+            <a:r>
+              <a:rPr b="0" lang="en-US" sz="1800" spc="-1" strike="noStrike">
+                <a:latin typeface="Arial"/>
+              </a:rPr>
+              <a:t>ES</a:t>
+            </a:r>
+            <a:endParaRPr b="0" lang="en-US" sz="1800" spc="-1" strike="noStrike">
+              <a:latin typeface="Arial"/>
+            </a:endParaRPr>
+          </a:p>
+        </p:txBody>
+      </p:sp>
+      <p:sp>
+        <p:nvSpPr>
+          <p:cNvPr id="207" name="Line 4"/>
+          <p:cNvSpPr/>
+          <p:nvPr/>
+        </p:nvSpPr>
+        <p:spPr>
+          <a:xfrm flipH="1">
+            <a:off x="1737360" y="1554480"/>
+            <a:ext cx="893520" cy="0"/>
+          </a:xfrm>
+          <a:prstGeom prst="line">
+            <a:avLst/>
+          </a:prstGeom>
+          <a:ln>
+            <a:solidFill>
+              <a:srgbClr val="3465a4"/>
+            </a:solidFill>
+            <a:tailEnd len="med" type="triangle" w="med"/>
+          </a:ln>
+        </p:spPr>
+        <p:style>
+          <a:lnRef idx="0"/>
+          <a:fillRef idx="0"/>
+          <a:effectRef idx="0"/>
+          <a:fontRef idx="minor"/>
+        </p:style>
+      </p:sp>
+      <p:sp>
+        <p:nvSpPr>
+          <p:cNvPr id="208" name="TextShape 5"/>
+          <p:cNvSpPr txBox="1"/>
+          <p:nvPr/>
+        </p:nvSpPr>
+        <p:spPr>
+          <a:xfrm>
+            <a:off x="3898800" y="1371600"/>
+            <a:ext cx="5226840" cy="602280"/>
+          </a:xfrm>
+          <a:prstGeom prst="rect">
+            <a:avLst/>
+          </a:prstGeom>
+          <a:noFill/>
+          <a:ln>
+            <a:noFill/>
+          </a:ln>
+        </p:spPr>
+        <p:txBody>
+          <a:bodyPr lIns="90000" rIns="90000" tIns="45000" bIns="45000">
+            <a:noAutofit/>
+          </a:bodyPr>
+          <a:p>
+            <a:r>
+              <a:rPr b="1" lang="en-US" sz="1800" spc="-1" strike="noStrike">
+                <a:latin typeface="Arial"/>
+              </a:rPr>
+              <a:t>Subramanian </a:t>
+            </a:r>
+            <a:r>
+              <a:rPr b="1" lang="en-US" sz="1800" spc="-1" strike="noStrike">
+                <a:latin typeface="Arial"/>
+              </a:rPr>
+              <a:t>et al. 2005 : </a:t>
+            </a:r>
+            <a:r>
+              <a:rPr b="0" lang="en-US" sz="1800" spc="-1" strike="noStrike">
+                <a:latin typeface="Arial"/>
+              </a:rPr>
+              <a:t>normalization </a:t>
+            </a:r>
+            <a:endParaRPr b="0" lang="en-US" sz="1800" spc="-1" strike="noStrike">
+              <a:latin typeface="Arial"/>
+            </a:endParaRPr>
+          </a:p>
+          <a:p>
+            <a:r>
+              <a:rPr b="0" lang="en-US" sz="1800" spc="-1" strike="noStrike">
+                <a:latin typeface="Arial"/>
+              </a:rPr>
+              <a:t>	</a:t>
+            </a:r>
+            <a:r>
+              <a:rPr b="0" lang="en-US" sz="1800" spc="-1" strike="noStrike">
+                <a:latin typeface="Arial"/>
+              </a:rPr>
+              <a:t>by </a:t>
+            </a:r>
+            <a:r>
+              <a:rPr b="0" lang="en-US" sz="1800" spc="-1" strike="noStrike">
+                <a:latin typeface="Arial"/>
+              </a:rPr>
+              <a:t>comparison </a:t>
+            </a:r>
+            <a:r>
+              <a:rPr b="0" lang="en-US" sz="1800" spc="-1" strike="noStrike">
+                <a:latin typeface="Arial"/>
+              </a:rPr>
+              <a:t>with gene-label </a:t>
+            </a:r>
+            <a:r>
+              <a:rPr b="0" lang="en-US" sz="1800" spc="-1" strike="noStrike">
+                <a:latin typeface="Arial"/>
+              </a:rPr>
+              <a:t>permuted sets</a:t>
+            </a:r>
+            <a:endParaRPr b="0" lang="en-US" sz="1800" spc="-1" strike="noStrike">
+              <a:latin typeface="Arial"/>
+            </a:endParaRPr>
+          </a:p>
+        </p:txBody>
+      </p:sp>
+      <p:sp>
+        <p:nvSpPr>
+          <p:cNvPr id="209" name="TextShape 6"/>
+          <p:cNvSpPr txBox="1"/>
+          <p:nvPr/>
+        </p:nvSpPr>
+        <p:spPr>
+          <a:xfrm>
+            <a:off x="3899160" y="2091960"/>
+            <a:ext cx="5066640" cy="858240"/>
+          </a:xfrm>
+          <a:prstGeom prst="rect">
+            <a:avLst/>
+          </a:prstGeom>
+          <a:noFill/>
+          <a:ln>
+            <a:noFill/>
+          </a:ln>
+        </p:spPr>
+        <p:txBody>
+          <a:bodyPr lIns="90000" rIns="90000" tIns="45000" bIns="45000">
+            <a:noAutofit/>
+          </a:bodyPr>
+          <a:p>
+            <a:r>
+              <a:rPr b="1" lang="en-US" sz="1800" spc="-1" strike="noStrike">
+                <a:latin typeface="Arial"/>
+              </a:rPr>
+              <a:t>Korotkevich </a:t>
+            </a:r>
+            <a:r>
+              <a:rPr b="1" lang="en-US" sz="1800" spc="-1" strike="noStrike">
+                <a:latin typeface="Arial"/>
+              </a:rPr>
+              <a:t>et al. 2021 : </a:t>
+            </a:r>
+            <a:r>
+              <a:rPr b="1" lang="en-US" sz="1800" spc="-1" strike="noStrike">
+                <a:latin typeface="Arial"/>
+              </a:rPr>
+              <a:t>fGSEA</a:t>
+            </a:r>
+            <a:r>
+              <a:rPr b="0" lang="en-US" sz="1800" spc="-1" strike="noStrike">
+                <a:latin typeface="Arial"/>
+              </a:rPr>
+              <a:t>: </a:t>
+            </a:r>
+            <a:r>
+              <a:rPr b="0" lang="en-US" sz="1800" spc="-1" strike="noStrike">
+                <a:latin typeface="Arial"/>
+              </a:rPr>
+              <a:t>normalization</a:t>
+            </a:r>
+            <a:endParaRPr b="0" lang="en-US" sz="1800" spc="-1" strike="noStrike">
+              <a:latin typeface="Arial"/>
+            </a:endParaRPr>
+          </a:p>
+          <a:p>
+            <a:r>
+              <a:rPr b="0" lang="en-US" sz="1800" spc="-1" strike="noStrike">
+                <a:latin typeface="Arial"/>
+              </a:rPr>
+              <a:t>      </a:t>
+            </a:r>
+            <a:r>
+              <a:rPr b="0" lang="en-US" sz="1800" spc="-1" strike="noStrike">
+                <a:latin typeface="Arial"/>
+              </a:rPr>
+              <a:t>With </a:t>
+            </a:r>
+            <a:r>
+              <a:rPr b="0" lang="en-US" sz="1800" spc="-1" strike="noStrike">
+                <a:latin typeface="Arial"/>
+              </a:rPr>
+              <a:t>parallel </a:t>
+            </a:r>
+            <a:r>
+              <a:rPr b="0" lang="en-US" sz="1800" spc="-1" strike="noStrike">
+                <a:latin typeface="Arial"/>
+              </a:rPr>
+              <a:t>evaluation + </a:t>
+            </a:r>
+            <a:r>
+              <a:rPr b="0" lang="en-US" sz="1800" spc="-1" strike="noStrike">
+                <a:latin typeface="Arial"/>
+              </a:rPr>
+              <a:t>score heuristic </a:t>
+            </a:r>
+            <a:r>
+              <a:rPr b="0" lang="en-US" sz="1800" spc="-1" strike="noStrike">
+                <a:latin typeface="Arial"/>
+              </a:rPr>
+              <a:t>+</a:t>
+            </a:r>
+            <a:endParaRPr b="0" lang="en-US" sz="1800" spc="-1" strike="noStrike">
+              <a:latin typeface="Arial"/>
+            </a:endParaRPr>
+          </a:p>
+          <a:p>
+            <a:r>
+              <a:rPr b="0" lang="en-US" sz="1800" spc="-1" strike="noStrike">
+                <a:latin typeface="Arial"/>
+              </a:rPr>
+              <a:t>      </a:t>
+            </a:r>
+            <a:r>
+              <a:rPr b="0" lang="en-US" sz="1800" spc="-1" strike="noStrike">
+                <a:latin typeface="Arial"/>
+              </a:rPr>
+              <a:t>Refinement of </a:t>
+            </a:r>
+            <a:r>
+              <a:rPr b="0" lang="en-US" sz="1800" spc="-1" strike="noStrike">
+                <a:latin typeface="Arial"/>
+              </a:rPr>
+              <a:t>low p-values</a:t>
+            </a:r>
+            <a:endParaRPr b="0" lang="en-US" sz="1800" spc="-1" strike="noStrike">
+              <a:latin typeface="Arial"/>
+            </a:endParaRPr>
+          </a:p>
+        </p:txBody>
+      </p:sp>
+      <p:sp>
+        <p:nvSpPr>
+          <p:cNvPr id="210" name="CustomShape 7"/>
+          <p:cNvSpPr/>
+          <p:nvPr/>
+        </p:nvSpPr>
+        <p:spPr>
+          <a:xfrm>
+            <a:off x="3931920" y="2011680"/>
+            <a:ext cx="5029200" cy="938520"/>
+          </a:xfrm>
+          <a:prstGeom prst="rect">
+            <a:avLst/>
+          </a:prstGeom>
+          <a:noFill/>
+          <a:ln w="38160">
+            <a:solidFill>
+              <a:srgbClr val="3465a4"/>
+            </a:solidFill>
+            <a:round/>
+          </a:ln>
+        </p:spPr>
+        <p:style>
+          <a:lnRef idx="0"/>
+          <a:fillRef idx="0"/>
+          <a:effectRef idx="0"/>
+          <a:fontRef idx="minor"/>
+        </p:style>
+      </p:sp>
+      <p:sp>
+        <p:nvSpPr>
+          <p:cNvPr id="211" name="TextShape 8"/>
+          <p:cNvSpPr txBox="1"/>
+          <p:nvPr/>
+        </p:nvSpPr>
+        <p:spPr>
+          <a:xfrm>
+            <a:off x="6035040" y="2950200"/>
+            <a:ext cx="2835360" cy="602280"/>
+          </a:xfrm>
+          <a:prstGeom prst="rect">
+            <a:avLst/>
+          </a:prstGeom>
+          <a:noFill/>
+          <a:ln>
+            <a:noFill/>
+          </a:ln>
+        </p:spPr>
+        <p:txBody>
+          <a:bodyPr lIns="90000" rIns="90000" tIns="45000" bIns="45000">
+            <a:noAutofit/>
+          </a:bodyPr>
+          <a:p>
+            <a:r>
+              <a:rPr b="1" lang="en-US" sz="1800" spc="-1" strike="noStrike">
+                <a:latin typeface="Arial"/>
+              </a:rPr>
+              <a:t>~100x faster</a:t>
+            </a:r>
+            <a:endParaRPr b="1" lang="en-US" sz="1800" spc="-1" strike="noStrike">
+              <a:latin typeface="Arial"/>
+            </a:endParaRPr>
+          </a:p>
+          <a:p>
+            <a:r>
+              <a:rPr b="1" lang="en-US" sz="1800" spc="-1" strike="noStrike">
+                <a:latin typeface="Arial"/>
+              </a:rPr>
+              <a:t>Default in clusterProfiler</a:t>
+            </a:r>
+            <a:endParaRPr b="1" lang="en-US" sz="1800" spc="-1" strike="noStrike">
+              <a:latin typeface="Arial"/>
+            </a:endParaRPr>
+          </a:p>
+        </p:txBody>
+      </p:sp>
+    </p:spTree>
+  </p:cSld>
+  <p:transition spd="med">
+    <p:fade/>
+  </p:transition>
+</p:sld>
+</file>
+
+<file path=ppt/slides/slide21.xml><?xml version="1.0" encoding="utf-8"?>
+<p:sld xmlns:a="http://schemas.openxmlformats.org/drawingml/2006/main" xmlns:p="http://schemas.openxmlformats.org/presentationml/2006/main" xmlns:r="http://schemas.openxmlformats.org/officeDocument/2006/relationships" xmlns:p14="http://schemas.microsoft.com/office/powerpoint/2010/main" xmlns:p15="http://schemas.microsoft.com/office/powerpoint/2012/main" xmlns:mc="http://schemas.openxmlformats.org/markup-compatibility/2006">
+  <p:cSld>
+    <p:spTree>
+      <p:nvGrpSpPr>
+        <p:cNvPr id="1" name=""/>
+        <p:cNvGrpSpPr/>
+        <p:nvPr/>
+      </p:nvGrpSpPr>
+      <p:grpSpPr>
+        <a:xfrm>
+          <a:off x="0" y="0"/>
+          <a:ext cx="0" cy="0"/>
+          <a:chOff x="0" y="0"/>
+          <a:chExt cx="0" cy="0"/>
+        </a:xfrm>
+      </p:grpSpPr>
+      <p:sp>
+        <p:nvSpPr>
+          <p:cNvPr id="212" name="CustomShape 1"/>
+          <p:cNvSpPr/>
+          <p:nvPr/>
+        </p:nvSpPr>
+        <p:spPr>
+          <a:xfrm>
+            <a:off x="504000" y="404640"/>
+            <a:ext cx="8385120" cy="477000"/>
+          </a:xfrm>
+          <a:prstGeom prst="rect">
+            <a:avLst/>
+          </a:prstGeom>
+          <a:noFill/>
+          <a:ln>
+            <a:noFill/>
+          </a:ln>
+        </p:spPr>
+        <p:style>
+          <a:lnRef idx="0"/>
+          <a:fillRef idx="0"/>
+          <a:effectRef idx="0"/>
+          <a:fontRef idx="minor"/>
+        </p:style>
+        <p:txBody>
+          <a:bodyPr lIns="0" rIns="0" tIns="0" bIns="0" anchor="ctr">
+            <a:normAutofit/>
+          </a:bodyPr>
+          <a:p>
+            <a:pPr>
+              <a:lnSpc>
+                <a:spcPct val="100000"/>
+              </a:lnSpc>
+            </a:pPr>
+            <a:r>
+              <a:rPr b="0" lang="en-US" sz="3200" spc="-1" strike="noStrike">
+                <a:solidFill>
+                  <a:srgbClr val="323232"/>
+                </a:solidFill>
+                <a:latin typeface="Arial"/>
+                <a:ea typeface="DejaVu Sans"/>
+              </a:rPr>
+              <a:t>Enrichment analysis – </a:t>
+            </a:r>
+            <a:r>
+              <a:rPr b="0" lang="en-US" sz="2800" spc="-1" strike="noStrike">
+                <a:solidFill>
+                  <a:srgbClr val="323232"/>
+                </a:solidFill>
+                <a:latin typeface="Arial"/>
+                <a:ea typeface="DejaVu Sans"/>
+              </a:rPr>
+              <a:t>GSEA</a:t>
+            </a:r>
+            <a:endParaRPr b="0" lang="en-US" sz="2800" spc="-1" strike="noStrike">
+              <a:latin typeface="Arial"/>
+            </a:endParaRPr>
+          </a:p>
+        </p:txBody>
+      </p:sp>
+      <p:pic>
+        <p:nvPicPr>
+          <p:cNvPr id="213" name="" descr=""/>
+          <p:cNvPicPr/>
+          <p:nvPr/>
+        </p:nvPicPr>
+        <p:blipFill>
+          <a:blip r:embed="rId1"/>
+          <a:stretch/>
+        </p:blipFill>
+        <p:spPr>
+          <a:xfrm>
+            <a:off x="156600" y="1084320"/>
+            <a:ext cx="7980480" cy="5132520"/>
+          </a:xfrm>
+          <a:prstGeom prst="rect">
+            <a:avLst/>
+          </a:prstGeom>
+          <a:ln>
+            <a:noFill/>
+          </a:ln>
+        </p:spPr>
+      </p:pic>
+      <p:sp>
+        <p:nvSpPr>
+          <p:cNvPr id="214" name="CustomShape 2"/>
+          <p:cNvSpPr/>
+          <p:nvPr/>
+        </p:nvSpPr>
+        <p:spPr>
+          <a:xfrm>
+            <a:off x="638280" y="6309360"/>
+            <a:ext cx="7749360" cy="529560"/>
+          </a:xfrm>
+          <a:prstGeom prst="rect">
+            <a:avLst/>
+          </a:prstGeom>
+          <a:noFill/>
+          <a:ln>
+            <a:noFill/>
+          </a:ln>
+        </p:spPr>
+        <p:style>
+          <a:lnRef idx="0"/>
+          <a:fillRef idx="0"/>
+          <a:effectRef idx="0"/>
+          <a:fontRef idx="minor"/>
+        </p:style>
+        <p:txBody>
+          <a:bodyPr lIns="90000" rIns="90000" tIns="45000" bIns="45000">
+            <a:noAutofit/>
+          </a:bodyPr>
+          <a:p>
+            <a:pPr>
+              <a:lnSpc>
+                <a:spcPct val="100000"/>
+              </a:lnSpc>
+            </a:pPr>
+            <a:r>
+              <a:rPr b="0" lang="en-US" sz="1800" spc="-1" strike="noStrike">
+                <a:solidFill>
+                  <a:srgbClr val="000000"/>
+                </a:solidFill>
+                <a:latin typeface="Arial"/>
+                <a:ea typeface="DejaVu Sans"/>
+              </a:rPr>
+              <a:t>Enrichment Score visualized using functions from the R package enrichplot</a:t>
+            </a:r>
+            <a:endParaRPr b="0" lang="en-US" sz="1800" spc="-1" strike="noStrike">
+              <a:latin typeface="Arial"/>
+            </a:endParaRPr>
+          </a:p>
+          <a:p>
+            <a:pPr>
+              <a:lnSpc>
+                <a:spcPct val="100000"/>
+              </a:lnSpc>
+            </a:pPr>
+            <a:r>
+              <a:rPr b="0" lang="en-US" sz="1300" spc="-1" strike="noStrike">
+                <a:solidFill>
+                  <a:srgbClr val="000000"/>
+                </a:solidFill>
+                <a:latin typeface="Arial"/>
+                <a:ea typeface="DejaVu Sans"/>
+              </a:rPr>
+              <a:t>http://www.bioconductor.org/packages/release/bioc/html/enrichplot.html</a:t>
+            </a:r>
+            <a:endParaRPr b="0" lang="en-US" sz="1300" spc="-1" strike="noStrike">
+              <a:latin typeface="Arial"/>
+            </a:endParaRPr>
+          </a:p>
+        </p:txBody>
+      </p:sp>
+    </p:spTree>
+  </p:cSld>
+  <p:transition spd="med">
+    <p:fade/>
+  </p:transition>
+</p:sld>
+</file>
+
+<file path=ppt/slides/slide22.xml><?xml version="1.0" encoding="utf-8"?>
+<p:sld xmlns:a="http://schemas.openxmlformats.org/drawingml/2006/main" xmlns:p="http://schemas.openxmlformats.org/presentationml/2006/main" xmlns:r="http://schemas.openxmlformats.org/officeDocument/2006/relationships" xmlns:p14="http://schemas.microsoft.com/office/powerpoint/2010/main" xmlns:p15="http://schemas.microsoft.com/office/powerpoint/2012/main" xmlns:mc="http://schemas.openxmlformats.org/markup-compatibility/2006">
+  <p:cSld>
+    <p:spTree>
+      <p:nvGrpSpPr>
+        <p:cNvPr id="1" name=""/>
+        <p:cNvGrpSpPr/>
+        <p:nvPr/>
+      </p:nvGrpSpPr>
+      <p:grpSpPr>
+        <a:xfrm>
+          <a:off x="0" y="0"/>
+          <a:ext cx="0" cy="0"/>
+          <a:chOff x="0" y="0"/>
+          <a:chExt cx="0" cy="0"/>
+        </a:xfrm>
+      </p:grpSpPr>
+      <p:sp>
+        <p:nvSpPr>
+          <p:cNvPr id="215" name="CustomShape 1"/>
+          <p:cNvSpPr/>
+          <p:nvPr/>
+        </p:nvSpPr>
+        <p:spPr>
+          <a:xfrm>
+            <a:off x="504000" y="404640"/>
+            <a:ext cx="8385120" cy="477000"/>
+          </a:xfrm>
+          <a:prstGeom prst="rect">
+            <a:avLst/>
+          </a:prstGeom>
+          <a:noFill/>
+          <a:ln>
+            <a:noFill/>
+          </a:ln>
+        </p:spPr>
+        <p:style>
+          <a:lnRef idx="0"/>
+          <a:fillRef idx="0"/>
+          <a:effectRef idx="0"/>
+          <a:fontRef idx="minor"/>
+        </p:style>
+        <p:txBody>
+          <a:bodyPr lIns="0" rIns="0" tIns="0" bIns="0" anchor="ctr">
+            <a:normAutofit/>
+          </a:bodyPr>
+          <a:p>
+            <a:pPr>
+              <a:lnSpc>
+                <a:spcPct val="100000"/>
+              </a:lnSpc>
+            </a:pPr>
+            <a:r>
+              <a:rPr b="0" lang="en-US" sz="3200" spc="-1" strike="noStrike">
+                <a:solidFill>
+                  <a:srgbClr val="323232"/>
+                </a:solidFill>
+                <a:latin typeface="Arial"/>
+                <a:ea typeface="DejaVu Sans"/>
+              </a:rPr>
+              <a:t>Enrichment analysis – </a:t>
+            </a:r>
+            <a:r>
+              <a:rPr b="0" lang="en-US" sz="2800" spc="-1" strike="noStrike">
+                <a:solidFill>
+                  <a:srgbClr val="323232"/>
+                </a:solidFill>
+                <a:latin typeface="Arial"/>
+                <a:ea typeface="DejaVu Sans"/>
+              </a:rPr>
+              <a:t>computing enrichment</a:t>
+            </a:r>
+            <a:endParaRPr b="0" lang="en-US" sz="2800" spc="-1" strike="noStrike">
+              <a:latin typeface="Arial"/>
+            </a:endParaRPr>
+          </a:p>
+        </p:txBody>
+      </p:sp>
+      <p:sp>
+        <p:nvSpPr>
+          <p:cNvPr id="216" name="CustomShape 2"/>
+          <p:cNvSpPr/>
+          <p:nvPr/>
+        </p:nvSpPr>
+        <p:spPr>
+          <a:xfrm>
+            <a:off x="504000" y="1340640"/>
+            <a:ext cx="8096760" cy="5397480"/>
+          </a:xfrm>
+          <a:prstGeom prst="rect">
+            <a:avLst/>
+          </a:prstGeom>
+          <a:noFill/>
+          <a:ln>
+            <a:noFill/>
+          </a:ln>
+        </p:spPr>
+        <p:style>
+          <a:lnRef idx="0"/>
+          <a:fillRef idx="0"/>
+          <a:effectRef idx="0"/>
+          <a:fontRef idx="minor"/>
+        </p:style>
+        <p:txBody>
+          <a:bodyPr lIns="0" rIns="0" tIns="0" bIns="0">
+            <a:noAutofit/>
+          </a:bodyPr>
+          <a:p>
+            <a:pPr lvl="1" marL="360000" indent="-356760">
+              <a:lnSpc>
+                <a:spcPct val="100000"/>
+              </a:lnSpc>
+              <a:spcBef>
+                <a:spcPts val="2401"/>
+              </a:spcBef>
+              <a:buSzPct val="100000"/>
+              <a:buBlip>
+                <a:blip r:embed="rId1"/>
+              </a:buBlip>
+            </a:pPr>
+            <a:r>
+              <a:rPr b="1" lang="en-US" sz="2400" spc="-1" strike="noStrike">
+                <a:solidFill>
+                  <a:srgbClr val="323232"/>
+                </a:solidFill>
+                <a:latin typeface="Arial"/>
+                <a:ea typeface="DejaVu Sans"/>
+              </a:rPr>
+              <a:t>Many more methods or implementations:</a:t>
+            </a:r>
+            <a:endParaRPr b="0" lang="en-US" sz="2400" spc="-1" strike="noStrike">
+              <a:latin typeface="Arial"/>
+            </a:endParaRPr>
+          </a:p>
+          <a:p>
+            <a:pPr lvl="1" marL="360000" indent="-356760">
+              <a:lnSpc>
+                <a:spcPct val="100000"/>
+              </a:lnSpc>
+              <a:spcBef>
+                <a:spcPts val="2401"/>
+              </a:spcBef>
+              <a:buSzPct val="100000"/>
+              <a:buBlip>
+                <a:blip r:embed="rId2"/>
+              </a:buBlip>
+            </a:pPr>
+            <a:r>
+              <a:rPr b="1" lang="en-US" sz="2400" spc="-1" strike="noStrike">
+                <a:solidFill>
+                  <a:srgbClr val="323232"/>
+                </a:solidFill>
+                <a:latin typeface="Arial"/>
+                <a:ea typeface="DejaVu Sans"/>
+              </a:rPr>
+              <a:t>Signaling Pathway Impact Analysis</a:t>
+            </a:r>
+            <a:endParaRPr b="0" lang="en-US" sz="2400" spc="-1" strike="noStrike">
+              <a:latin typeface="Arial"/>
+            </a:endParaRPr>
+          </a:p>
+          <a:p>
+            <a:pPr lvl="2" marL="648000" indent="-214920">
+              <a:lnSpc>
+                <a:spcPct val="100000"/>
+              </a:lnSpc>
+              <a:spcBef>
+                <a:spcPts val="2401"/>
+              </a:spcBef>
+              <a:buClr>
+                <a:srgbClr val="000000"/>
+              </a:buClr>
+              <a:buSzPct val="45000"/>
+              <a:buFont typeface="Wingdings" charset="2"/>
+              <a:buChar char=""/>
+            </a:pPr>
+            <a:r>
+              <a:rPr b="1" lang="en-US" sz="1800" spc="-1" strike="noStrike">
+                <a:solidFill>
+                  <a:srgbClr val="323232"/>
+                </a:solidFill>
+                <a:latin typeface="Arial"/>
+                <a:ea typeface="DejaVu Sans"/>
+              </a:rPr>
+              <a:t>https://bioconductor.org/packages/release/bioc/html/SPIA.html</a:t>
+            </a:r>
+            <a:endParaRPr b="0" lang="en-US" sz="1800" spc="-1" strike="noStrike">
+              <a:latin typeface="Arial"/>
+            </a:endParaRPr>
+          </a:p>
+          <a:p>
+            <a:pPr lvl="1" marL="360000" indent="-356760">
               <a:lnSpc>
                 <a:spcPct val="100000"/>
               </a:lnSpc>
@@ -9206,11 +10148,566 @@
                 <a:blip r:embed="rId3"/>
               </a:buBlip>
             </a:pPr>
+            <a:r>
+              <a:rPr b="1" lang="en-US" sz="2400" spc="-1" strike="noStrike">
+                <a:solidFill>
+                  <a:srgbClr val="323232"/>
+                </a:solidFill>
+                <a:latin typeface="Arial"/>
+                <a:ea typeface="DejaVu Sans"/>
+              </a:rPr>
+              <a:t>ISMARA</a:t>
+            </a:r>
             <a:endParaRPr b="0" lang="en-US" sz="2400" spc="-1" strike="noStrike">
               <a:latin typeface="Arial"/>
             </a:endParaRPr>
           </a:p>
-        </p:txBody>
+          <a:p>
+            <a:pPr lvl="2" marL="648000" indent="-214920">
+              <a:lnSpc>
+                <a:spcPct val="100000"/>
+              </a:lnSpc>
+              <a:spcBef>
+                <a:spcPts val="2401"/>
+              </a:spcBef>
+              <a:buClr>
+                <a:srgbClr val="000000"/>
+              </a:buClr>
+              <a:buSzPct val="45000"/>
+              <a:buFont typeface="Wingdings" charset="2"/>
+              <a:buChar char=""/>
+            </a:pPr>
+            <a:r>
+              <a:rPr b="1" lang="en-US" sz="1800" spc="-1" strike="noStrike" u="sng">
+                <a:solidFill>
+                  <a:srgbClr val="575757"/>
+                </a:solidFill>
+                <a:uFillTx/>
+                <a:latin typeface="Arial"/>
+                <a:ea typeface="DejaVu Sans"/>
+                <a:hlinkClick r:id="rId4"/>
+              </a:rPr>
+              <a:t>https://ismara.unibas.ch/mara/</a:t>
+            </a:r>
+            <a:endParaRPr b="0" lang="en-US" sz="1800" spc="-1" strike="noStrike">
+              <a:latin typeface="Arial"/>
+            </a:endParaRPr>
+          </a:p>
+          <a:p>
+            <a:pPr>
+              <a:lnSpc>
+                <a:spcPct val="100000"/>
+              </a:lnSpc>
+              <a:spcBef>
+                <a:spcPts val="2401"/>
+              </a:spcBef>
+            </a:pPr>
+            <a:endParaRPr b="0" lang="en-US" sz="1800" spc="-1" strike="noStrike">
+              <a:latin typeface="Arial"/>
+            </a:endParaRPr>
+          </a:p>
+          <a:p>
+            <a:pPr lvl="1" marL="360000" indent="-356760">
+              <a:lnSpc>
+                <a:spcPct val="100000"/>
+              </a:lnSpc>
+              <a:spcBef>
+                <a:spcPts val="2401"/>
+              </a:spcBef>
+              <a:buSzPct val="100000"/>
+              <a:buBlip>
+                <a:blip r:embed="rId5"/>
+              </a:buBlip>
+            </a:pPr>
+            <a:r>
+              <a:rPr b="1" lang="en-US" sz="2400" spc="-1" strike="noStrike">
+                <a:solidFill>
+                  <a:srgbClr val="323232"/>
+                </a:solidFill>
+                <a:latin typeface="Arial"/>
+                <a:ea typeface="DejaVu Sans"/>
+              </a:rPr>
+              <a:t>...</a:t>
+            </a:r>
+            <a:endParaRPr b="0" lang="en-US" sz="2400" spc="-1" strike="noStrike">
+              <a:latin typeface="Arial"/>
+            </a:endParaRPr>
+          </a:p>
+          <a:p>
+            <a:pPr>
+              <a:lnSpc>
+                <a:spcPct val="100000"/>
+              </a:lnSpc>
+              <a:spcBef>
+                <a:spcPts val="2401"/>
+              </a:spcBef>
+            </a:pPr>
+            <a:endParaRPr b="0" lang="en-US" sz="2400" spc="-1" strike="noStrike">
+              <a:latin typeface="Arial"/>
+            </a:endParaRPr>
+          </a:p>
+          <a:p>
+            <a:pPr>
+              <a:lnSpc>
+                <a:spcPct val="100000"/>
+              </a:lnSpc>
+              <a:spcBef>
+                <a:spcPts val="2401"/>
+              </a:spcBef>
+            </a:pPr>
+            <a:endParaRPr b="0" lang="en-US" sz="2400" spc="-1" strike="noStrike">
+              <a:latin typeface="Arial"/>
+            </a:endParaRPr>
+          </a:p>
+          <a:p>
+            <a:pPr>
+              <a:lnSpc>
+                <a:spcPct val="100000"/>
+              </a:lnSpc>
+              <a:spcBef>
+                <a:spcPts val="2401"/>
+              </a:spcBef>
+            </a:pPr>
+            <a:endParaRPr b="0" lang="en-US" sz="2400" spc="-1" strike="noStrike">
+              <a:latin typeface="Arial"/>
+            </a:endParaRPr>
+          </a:p>
+          <a:p>
+            <a:pPr>
+              <a:lnSpc>
+                <a:spcPct val="100000"/>
+              </a:lnSpc>
+              <a:spcBef>
+                <a:spcPts val="2401"/>
+              </a:spcBef>
+            </a:pPr>
+            <a:endParaRPr b="0" lang="en-US" sz="2400" spc="-1" strike="noStrike">
+              <a:latin typeface="Arial"/>
+            </a:endParaRPr>
+          </a:p>
+          <a:p>
+            <a:pPr>
+              <a:lnSpc>
+                <a:spcPct val="100000"/>
+              </a:lnSpc>
+              <a:spcBef>
+                <a:spcPts val="2401"/>
+              </a:spcBef>
+            </a:pPr>
+            <a:endParaRPr b="0" lang="en-US" sz="2400" spc="-1" strike="noStrike">
+              <a:latin typeface="Arial"/>
+            </a:endParaRPr>
+          </a:p>
+          <a:p>
+            <a:pPr>
+              <a:lnSpc>
+                <a:spcPct val="100000"/>
+              </a:lnSpc>
+              <a:spcBef>
+                <a:spcPts val="2401"/>
+              </a:spcBef>
+            </a:pPr>
+            <a:endParaRPr b="0" lang="en-US" sz="2400" spc="-1" strike="noStrike">
+              <a:latin typeface="Arial"/>
+            </a:endParaRPr>
+          </a:p>
+        </p:txBody>
+      </p:sp>
+    </p:spTree>
+  </p:cSld>
+  <p:transition spd="med">
+    <p:fade/>
+  </p:transition>
+</p:sld>
+</file>
+
+<file path=ppt/slides/slide23.xml><?xml version="1.0" encoding="utf-8"?>
+<p:sld xmlns:a="http://schemas.openxmlformats.org/drawingml/2006/main" xmlns:p="http://schemas.openxmlformats.org/presentationml/2006/main" xmlns:r="http://schemas.openxmlformats.org/officeDocument/2006/relationships" xmlns:p14="http://schemas.microsoft.com/office/powerpoint/2010/main" xmlns:p15="http://schemas.microsoft.com/office/powerpoint/2012/main" xmlns:mc="http://schemas.openxmlformats.org/markup-compatibility/2006">
+  <p:cSld>
+    <p:spTree>
+      <p:nvGrpSpPr>
+        <p:cNvPr id="1" name=""/>
+        <p:cNvGrpSpPr/>
+        <p:nvPr/>
+      </p:nvGrpSpPr>
+      <p:grpSpPr>
+        <a:xfrm>
+          <a:off x="0" y="0"/>
+          <a:ext cx="0" cy="0"/>
+          <a:chOff x="0" y="0"/>
+          <a:chExt cx="0" cy="0"/>
+        </a:xfrm>
+      </p:grpSpPr>
+      <p:sp>
+        <p:nvSpPr>
+          <p:cNvPr id="217" name="CustomShape 1"/>
+          <p:cNvSpPr/>
+          <p:nvPr/>
+        </p:nvSpPr>
+        <p:spPr>
+          <a:xfrm>
+            <a:off x="504000" y="404640"/>
+            <a:ext cx="8385120" cy="477000"/>
+          </a:xfrm>
+          <a:prstGeom prst="rect">
+            <a:avLst/>
+          </a:prstGeom>
+          <a:noFill/>
+          <a:ln>
+            <a:noFill/>
+          </a:ln>
+        </p:spPr>
+        <p:style>
+          <a:lnRef idx="0"/>
+          <a:fillRef idx="0"/>
+          <a:effectRef idx="0"/>
+          <a:fontRef idx="minor"/>
+        </p:style>
+        <p:txBody>
+          <a:bodyPr lIns="0" rIns="0" tIns="0" bIns="0" anchor="ctr">
+            <a:normAutofit/>
+          </a:bodyPr>
+          <a:p>
+            <a:pPr>
+              <a:lnSpc>
+                <a:spcPct val="100000"/>
+              </a:lnSpc>
+            </a:pPr>
+            <a:r>
+              <a:rPr b="0" lang="en-US" sz="3200" spc="-1" strike="noStrike">
+                <a:solidFill>
+                  <a:srgbClr val="323232"/>
+                </a:solidFill>
+                <a:latin typeface="Arial"/>
+                <a:ea typeface="DejaVu Sans"/>
+              </a:rPr>
+              <a:t>Practical</a:t>
+            </a:r>
+            <a:endParaRPr b="0" lang="en-US" sz="3200" spc="-1" strike="noStrike">
+              <a:latin typeface="Arial"/>
+            </a:endParaRPr>
+          </a:p>
+        </p:txBody>
+      </p:sp>
+      <p:sp>
+        <p:nvSpPr>
+          <p:cNvPr id="218" name="CustomShape 2"/>
+          <p:cNvSpPr/>
+          <p:nvPr/>
+        </p:nvSpPr>
+        <p:spPr>
+          <a:xfrm>
+            <a:off x="504000" y="1340640"/>
+            <a:ext cx="8096760" cy="5397480"/>
+          </a:xfrm>
+          <a:prstGeom prst="rect">
+            <a:avLst/>
+          </a:prstGeom>
+          <a:noFill/>
+          <a:ln>
+            <a:noFill/>
+          </a:ln>
+        </p:spPr>
+        <p:style>
+          <a:lnRef idx="0"/>
+          <a:fillRef idx="0"/>
+          <a:effectRef idx="0"/>
+          <a:fontRef idx="minor"/>
+        </p:style>
+        <p:txBody>
+          <a:bodyPr lIns="0" rIns="0" tIns="0" bIns="0">
+            <a:noAutofit/>
+          </a:bodyPr>
+          <a:p>
+            <a:pPr lvl="1" marL="360000" indent="-356760">
+              <a:lnSpc>
+                <a:spcPct val="100000"/>
+              </a:lnSpc>
+              <a:spcBef>
+                <a:spcPts val="2401"/>
+              </a:spcBef>
+              <a:buSzPct val="100000"/>
+              <a:buBlip>
+                <a:blip r:embed="rId1"/>
+              </a:buBlip>
+            </a:pPr>
+            <a:r>
+              <a:rPr b="1" lang="en-US" sz="2400" spc="-1" strike="noStrike">
+                <a:solidFill>
+                  <a:srgbClr val="323232"/>
+                </a:solidFill>
+                <a:latin typeface="Arial"/>
+                <a:ea typeface="DejaVu Sans"/>
+              </a:rPr>
+              <a:t>Go to the website and follow the Enrichment practical</a:t>
+            </a:r>
+            <a:endParaRPr b="0" lang="en-US" sz="2400" spc="-1" strike="noStrike">
+              <a:latin typeface="Arial"/>
+            </a:endParaRPr>
+          </a:p>
+          <a:p>
+            <a:pPr>
+              <a:lnSpc>
+                <a:spcPct val="100000"/>
+              </a:lnSpc>
+              <a:spcBef>
+                <a:spcPts val="2401"/>
+              </a:spcBef>
+            </a:pPr>
+            <a:endParaRPr b="0" lang="en-US" sz="2400" spc="-1" strike="noStrike">
+              <a:latin typeface="Arial"/>
+            </a:endParaRPr>
+          </a:p>
+        </p:txBody>
+      </p:sp>
+    </p:spTree>
+  </p:cSld>
+  <p:transition spd="med">
+    <p:fade/>
+  </p:transition>
+</p:sld>
+</file>
+
+<file path=ppt/slides/slide24.xml><?xml version="1.0" encoding="utf-8"?>
+<p:sld xmlns:a="http://schemas.openxmlformats.org/drawingml/2006/main" xmlns:p="http://schemas.openxmlformats.org/presentationml/2006/main" xmlns:r="http://schemas.openxmlformats.org/officeDocument/2006/relationships" xmlns:p14="http://schemas.microsoft.com/office/powerpoint/2010/main" xmlns:p15="http://schemas.microsoft.com/office/powerpoint/2012/main" xmlns:mc="http://schemas.openxmlformats.org/markup-compatibility/2006">
+  <p:cSld>
+    <p:spTree>
+      <p:nvGrpSpPr>
+        <p:cNvPr id="1" name=""/>
+        <p:cNvGrpSpPr/>
+        <p:nvPr/>
+      </p:nvGrpSpPr>
+      <p:grpSpPr>
+        <a:xfrm>
+          <a:off x="0" y="0"/>
+          <a:ext cx="0" cy="0"/>
+          <a:chOff x="0" y="0"/>
+          <a:chExt cx="0" cy="0"/>
+        </a:xfrm>
+      </p:grpSpPr>
+      <p:sp>
+        <p:nvSpPr>
+          <p:cNvPr id="219" name="CustomShape 1"/>
+          <p:cNvSpPr/>
+          <p:nvPr/>
+        </p:nvSpPr>
+        <p:spPr>
+          <a:xfrm>
+            <a:off x="504000" y="3933000"/>
+            <a:ext cx="8096760" cy="2161080"/>
+          </a:xfrm>
+          <a:prstGeom prst="rect">
+            <a:avLst/>
+          </a:prstGeom>
+          <a:noFill/>
+          <a:ln>
+            <a:noFill/>
+          </a:ln>
+        </p:spPr>
+        <p:style>
+          <a:lnRef idx="0"/>
+          <a:fillRef idx="0"/>
+          <a:effectRef idx="0"/>
+          <a:fontRef idx="minor"/>
+        </p:style>
+        <p:txBody>
+          <a:bodyPr lIns="0" rIns="0" tIns="0" bIns="0" anchor="ctr">
+            <a:normAutofit fontScale="60000"/>
+          </a:bodyPr>
+          <a:p>
+            <a:pPr>
+              <a:lnSpc>
+                <a:spcPct val="100000"/>
+              </a:lnSpc>
+            </a:pPr>
+            <a:r>
+              <a:rPr b="1" lang="en-US" sz="4000" spc="-1" strike="noStrike">
+                <a:solidFill>
+                  <a:srgbClr val="e30613"/>
+                </a:solidFill>
+                <a:latin typeface="Arial"/>
+                <a:ea typeface="DejaVu Sans"/>
+              </a:rPr>
+              <a:t>Contributors:</a:t>
+            </a:r>
+            <a:br/>
+            <a:br/>
+            <a:r>
+              <a:rPr b="1" lang="en-US" sz="2200" spc="-1" strike="noStrike">
+                <a:solidFill>
+                  <a:srgbClr val="e30613"/>
+                </a:solidFill>
+                <a:latin typeface="Arial"/>
+                <a:ea typeface="DejaVu Sans"/>
+              </a:rPr>
+              <a:t>Geoffrey Fucile</a:t>
+            </a:r>
+            <a:br/>
+            <a:r>
+              <a:rPr b="1" lang="en-US" sz="2200" spc="-1" strike="noStrike">
+                <a:solidFill>
+                  <a:srgbClr val="e30613"/>
+                </a:solidFill>
+                <a:latin typeface="Arial"/>
+                <a:ea typeface="DejaVu Sans"/>
+              </a:rPr>
+              <a:t>Walid Gharib</a:t>
+            </a:r>
+            <a:br/>
+            <a:r>
+              <a:rPr b="1" lang="en-US" sz="2200" spc="-1" strike="noStrike">
+                <a:solidFill>
+                  <a:srgbClr val="e30613"/>
+                </a:solidFill>
+                <a:latin typeface="Arial"/>
+                <a:ea typeface="DejaVu Sans"/>
+              </a:rPr>
+              <a:t>Irene Keller</a:t>
+            </a:r>
+            <a:br/>
+            <a:r>
+              <a:rPr b="1" lang="en-US" sz="2200" spc="-1" strike="noStrike">
+                <a:solidFill>
+                  <a:srgbClr val="e30613"/>
+                </a:solidFill>
+                <a:latin typeface="Arial"/>
+                <a:ea typeface="DejaVu Sans"/>
+              </a:rPr>
+              <a:t>Pablo Escobar Lopez</a:t>
+            </a:r>
+            <a:br/>
+            <a:r>
+              <a:rPr b="1" lang="en-US" sz="2200" spc="-1" strike="noStrike">
+                <a:solidFill>
+                  <a:srgbClr val="e30613"/>
+                </a:solidFill>
+                <a:latin typeface="Arial"/>
+                <a:ea typeface="DejaVu Sans"/>
+              </a:rPr>
+              <a:t>Charlotte Soneson</a:t>
+            </a:r>
+            <a:br/>
+            <a:br/>
+            <a:endParaRPr b="0" lang="en-US" sz="2200" spc="-1" strike="noStrike">
+              <a:latin typeface="Arial"/>
+            </a:endParaRPr>
+          </a:p>
+        </p:txBody>
+      </p:sp>
+      <p:pic>
+        <p:nvPicPr>
+          <p:cNvPr id="220" name="Espace réservé pour une image  17" descr=""/>
+          <p:cNvPicPr/>
+          <p:nvPr/>
+        </p:nvPicPr>
+        <p:blipFill>
+          <a:blip r:embed="rId1"/>
+          <a:srcRect l="1467" t="0" r="1467" b="12793"/>
+          <a:stretch/>
+        </p:blipFill>
+        <p:spPr>
+          <a:xfrm>
+            <a:off x="0" y="0"/>
+            <a:ext cx="9140760" cy="3425760"/>
+          </a:xfrm>
+          <a:prstGeom prst="rect">
+            <a:avLst/>
+          </a:prstGeom>
+          <a:ln>
+            <a:noFill/>
+          </a:ln>
+        </p:spPr>
+      </p:pic>
+      <p:sp>
+        <p:nvSpPr>
+          <p:cNvPr id="221" name="Line 2"/>
+          <p:cNvSpPr/>
+          <p:nvPr/>
+        </p:nvSpPr>
+        <p:spPr>
+          <a:xfrm>
+            <a:off x="0" y="3424680"/>
+            <a:ext cx="9144000" cy="1440"/>
+          </a:xfrm>
+          <a:prstGeom prst="line">
+            <a:avLst/>
+          </a:prstGeom>
+          <a:ln w="19080">
+            <a:solidFill>
+              <a:srgbClr val="e30613"/>
+            </a:solidFill>
+            <a:round/>
+          </a:ln>
+        </p:spPr>
+        <p:style>
+          <a:lnRef idx="1">
+            <a:schemeClr val="accent6"/>
+          </a:lnRef>
+          <a:fillRef idx="0">
+            <a:schemeClr val="accent6"/>
+          </a:fillRef>
+          <a:effectRef idx="0">
+            <a:schemeClr val="accent6"/>
+          </a:effectRef>
+          <a:fontRef idx="minor"/>
+        </p:style>
+      </p:sp>
+      <p:pic>
+        <p:nvPicPr>
+          <p:cNvPr id="222" name="Picture 7" descr=""/>
+          <p:cNvPicPr/>
+          <p:nvPr/>
+        </p:nvPicPr>
+        <p:blipFill>
+          <a:blip r:embed="rId2"/>
+          <a:stretch/>
+        </p:blipFill>
+        <p:spPr>
+          <a:xfrm>
+            <a:off x="7448400" y="3286080"/>
+            <a:ext cx="1325880" cy="716760"/>
+          </a:xfrm>
+          <a:prstGeom prst="rect">
+            <a:avLst/>
+          </a:prstGeom>
+          <a:ln>
+            <a:noFill/>
+          </a:ln>
+        </p:spPr>
+      </p:pic>
+      <p:sp>
+        <p:nvSpPr>
+          <p:cNvPr id="223" name="Line 3"/>
+          <p:cNvSpPr/>
+          <p:nvPr/>
+        </p:nvSpPr>
+        <p:spPr>
+          <a:xfrm>
+            <a:off x="0" y="-1440"/>
+            <a:ext cx="9144000" cy="1440"/>
+          </a:xfrm>
+          <a:prstGeom prst="line">
+            <a:avLst/>
+          </a:prstGeom>
+          <a:ln w="19080">
+            <a:solidFill>
+              <a:srgbClr val="e30613"/>
+            </a:solidFill>
+            <a:round/>
+          </a:ln>
+        </p:spPr>
+        <p:style>
+          <a:lnRef idx="1">
+            <a:schemeClr val="accent6"/>
+          </a:lnRef>
+          <a:fillRef idx="0">
+            <a:schemeClr val="accent6"/>
+          </a:fillRef>
+          <a:effectRef idx="0">
+            <a:schemeClr val="accent6"/>
+          </a:effectRef>
+          <a:fontRef idx="minor"/>
+        </p:style>
       </p:sp>
     </p:spTree>
   </p:cSld>
@@ -9246,7 +10743,7 @@
         <p:spPr>
           <a:xfrm>
             <a:off x="504000" y="404640"/>
-            <a:ext cx="8385480" cy="477360"/>
+            <a:ext cx="8385120" cy="477000"/>
           </a:xfrm>
           <a:prstGeom prst="rect">
             <a:avLst/>
@@ -9297,7 +10794,7 @@
         <p:spPr>
           <a:xfrm>
             <a:off x="504000" y="1340640"/>
-            <a:ext cx="8097120" cy="5397840"/>
+            <a:ext cx="8096760" cy="5397480"/>
           </a:xfrm>
           <a:prstGeom prst="rect">
             <a:avLst/>
@@ -9318,7 +10815,7 @@
             <a:noAutofit/>
           </a:bodyPr>
           <a:p>
-            <a:pPr lvl="1" marL="360000" indent="-357120">
+            <a:pPr lvl="1" marL="360000" indent="-356760">
               <a:lnSpc>
                 <a:spcPct val="100000"/>
               </a:lnSpc>
@@ -9345,7 +10842,7 @@
             </a:endParaRPr>
           </a:p>
           <a:p>
-            <a:pPr lvl="1" marL="360000" indent="-357120">
+            <a:pPr lvl="1" marL="360000" indent="-356760">
               <a:lnSpc>
                 <a:spcPct val="100000"/>
               </a:lnSpc>
@@ -9372,17 +10869,13 @@
             </a:endParaRPr>
           </a:p>
           <a:p>
-            <a:pPr lvl="1" marL="360000" indent="-357120">
+            <a:pPr>
               <a:lnSpc>
                 <a:spcPct val="100000"/>
               </a:lnSpc>
               <a:spcBef>
                 <a:spcPts val="2401"/>
               </a:spcBef>
-              <a:buSzPct val="100000"/>
-              <a:buBlip>
-                <a:blip r:embed="rId3"/>
-              </a:buBlip>
             </a:pPr>
             <a:endParaRPr b="0" lang="en-US" sz="2400" spc="-1" strike="noStrike">
               <a:latin typeface="Arial"/>
@@ -9392,14 +10885,14 @@
       </p:sp>
       <p:sp>
         <p:nvSpPr>
-          <p:cNvPr id="138" name="TextShape 3"/>
-          <p:cNvSpPr txBox="1"/>
+          <p:cNvPr id="138" name="CustomShape 3"/>
+          <p:cNvSpPr/>
           <p:nvPr/>
         </p:nvSpPr>
         <p:spPr>
           <a:xfrm>
             <a:off x="365760" y="4206240"/>
-            <a:ext cx="2377440" cy="1114200"/>
+            <a:ext cx="2377080" cy="1113840"/>
           </a:xfrm>
           <a:prstGeom prst="rect">
             <a:avLst/>
@@ -9409,6 +10902,12 @@
             <a:noFill/>
           </a:ln>
         </p:spPr>
+        <p:style>
+          <a:lnRef idx="0"/>
+          <a:fillRef idx="0"/>
+          <a:effectRef idx="0"/>
+          <a:fontRef idx="minor"/>
+        </p:style>
         <p:txBody>
           <a:bodyPr lIns="90000" rIns="90000" tIns="45000" bIns="45000">
             <a:noAutofit/>
@@ -9440,14 +10939,14 @@
       </p:sp>
       <p:sp>
         <p:nvSpPr>
-          <p:cNvPr id="139" name="TextShape 4"/>
-          <p:cNvSpPr txBox="1"/>
+          <p:cNvPr id="139" name="CustomShape 4"/>
+          <p:cNvSpPr/>
           <p:nvPr/>
         </p:nvSpPr>
         <p:spPr>
           <a:xfrm>
             <a:off x="5325840" y="3494160"/>
-            <a:ext cx="4001040" cy="3291840"/>
+            <a:ext cx="4000680" cy="3291480"/>
           </a:xfrm>
           <a:prstGeom prst="rect">
             <a:avLst/>
@@ -9457,6 +10956,12 @@
             <a:noFill/>
           </a:ln>
         </p:spPr>
+        <p:style>
+          <a:lnRef idx="0"/>
+          <a:fillRef idx="0"/>
+          <a:effectRef idx="0"/>
+          <a:fontRef idx="minor"/>
+        </p:style>
         <p:txBody>
           <a:bodyPr lIns="90000" rIns="90000" tIns="45000" bIns="45000">
             <a:noAutofit/>
@@ -9587,13 +11092,13 @@
         <p:spPr>
           <a:xfrm>
             <a:off x="2926080" y="4297680"/>
-            <a:ext cx="2377440" cy="457200"/>
+            <a:ext cx="2377080" cy="456840"/>
           </a:xfrm>
           <a:custGeom>
             <a:avLst/>
             <a:gdLst/>
             <a:ahLst/>
-            <a:rect l="0" t="0" r="r" b="b"/>
+            <a:rect l="l" t="t" r="r" b="b"/>
             <a:pathLst>
               <a:path w="6606" h="1272">
                 <a:moveTo>
@@ -9673,7 +11178,7 @@
         <p:spPr>
           <a:xfrm>
             <a:off x="504000" y="404640"/>
-            <a:ext cx="8385480" cy="477360"/>
+            <a:ext cx="8385120" cy="477000"/>
           </a:xfrm>
           <a:prstGeom prst="rect">
             <a:avLst/>
@@ -9724,7 +11229,7 @@
         <p:spPr>
           <a:xfrm>
             <a:off x="504000" y="1340640"/>
-            <a:ext cx="8097120" cy="5397840"/>
+            <a:ext cx="8096760" cy="5397480"/>
           </a:xfrm>
           <a:prstGeom prst="rect">
             <a:avLst/>
@@ -9745,7 +11250,7 @@
             <a:noAutofit/>
           </a:bodyPr>
           <a:p>
-            <a:pPr lvl="1" marL="360000" indent="-357120">
+            <a:pPr lvl="1" marL="360000" indent="-356760">
               <a:lnSpc>
                 <a:spcPct val="100000"/>
               </a:lnSpc>
@@ -9772,7 +11277,7 @@
             </a:endParaRPr>
           </a:p>
           <a:p>
-            <a:pPr lvl="1" marL="360000" indent="-357120">
+            <a:pPr lvl="1" marL="360000" indent="-356760">
               <a:lnSpc>
                 <a:spcPct val="100000"/>
               </a:lnSpc>
@@ -9799,17 +11304,13 @@
             </a:endParaRPr>
           </a:p>
           <a:p>
-            <a:pPr lvl="1" marL="360000" indent="-357120">
+            <a:pPr>
               <a:lnSpc>
                 <a:spcPct val="100000"/>
               </a:lnSpc>
               <a:spcBef>
                 <a:spcPts val="2401"/>
               </a:spcBef>
-              <a:buSzPct val="100000"/>
-              <a:buBlip>
-                <a:blip r:embed="rId3"/>
-              </a:buBlip>
             </a:pPr>
             <a:endParaRPr b="0" lang="en-US" sz="2400" spc="-1" strike="noStrike">
               <a:latin typeface="Arial"/>
@@ -9819,14 +11320,14 @@
       </p:sp>
       <p:sp>
         <p:nvSpPr>
-          <p:cNvPr id="143" name="TextShape 3"/>
-          <p:cNvSpPr txBox="1"/>
+          <p:cNvPr id="143" name="CustomShape 3"/>
+          <p:cNvSpPr/>
           <p:nvPr/>
         </p:nvSpPr>
         <p:spPr>
           <a:xfrm>
             <a:off x="365760" y="4206240"/>
-            <a:ext cx="2377440" cy="1114200"/>
+            <a:ext cx="2377080" cy="1113840"/>
           </a:xfrm>
           <a:prstGeom prst="rect">
             <a:avLst/>
@@ -9836,6 +11337,12 @@
             <a:noFill/>
           </a:ln>
         </p:spPr>
+        <p:style>
+          <a:lnRef idx="0"/>
+          <a:fillRef idx="0"/>
+          <a:effectRef idx="0"/>
+          <a:fontRef idx="minor"/>
+        </p:style>
         <p:txBody>
           <a:bodyPr lIns="90000" rIns="90000" tIns="45000" bIns="45000">
             <a:noAutofit/>
@@ -9867,14 +11374,14 @@
       </p:sp>
       <p:sp>
         <p:nvSpPr>
-          <p:cNvPr id="144" name="TextShape 4"/>
-          <p:cNvSpPr txBox="1"/>
+          <p:cNvPr id="144" name="CustomShape 4"/>
+          <p:cNvSpPr/>
           <p:nvPr/>
         </p:nvSpPr>
         <p:spPr>
           <a:xfrm>
             <a:off x="5325840" y="3494160"/>
-            <a:ext cx="4001040" cy="3291840"/>
+            <a:ext cx="4000680" cy="3291480"/>
           </a:xfrm>
           <a:prstGeom prst="rect">
             <a:avLst/>
@@ -9884,6 +11391,12 @@
             <a:noFill/>
           </a:ln>
         </p:spPr>
+        <p:style>
+          <a:lnRef idx="0"/>
+          <a:fillRef idx="0"/>
+          <a:effectRef idx="0"/>
+          <a:fontRef idx="minor"/>
+        </p:style>
         <p:txBody>
           <a:bodyPr lIns="90000" rIns="90000" tIns="45000" bIns="45000">
             <a:noAutofit/>
@@ -10014,13 +11527,13 @@
         <p:spPr>
           <a:xfrm>
             <a:off x="2926080" y="4297680"/>
-            <a:ext cx="2377440" cy="457200"/>
+            <a:ext cx="2377080" cy="456840"/>
           </a:xfrm>
           <a:custGeom>
             <a:avLst/>
             <a:gdLst/>
             <a:ahLst/>
-            <a:rect l="0" t="0" r="r" b="b"/>
+            <a:rect l="l" t="t" r="r" b="b"/>
             <a:pathLst>
               <a:path w="6606" h="1272">
                 <a:moveTo>
@@ -10069,14 +11582,14 @@
       </p:sp>
       <p:sp>
         <p:nvSpPr>
-          <p:cNvPr id="146" name="TextShape 6"/>
-          <p:cNvSpPr txBox="1"/>
+          <p:cNvPr id="146" name="CustomShape 6"/>
+          <p:cNvSpPr/>
           <p:nvPr/>
         </p:nvSpPr>
         <p:spPr>
           <a:xfrm>
             <a:off x="3566160" y="5029200"/>
-            <a:ext cx="1867680" cy="542880"/>
+            <a:ext cx="1867320" cy="542520"/>
           </a:xfrm>
           <a:prstGeom prst="rect">
             <a:avLst/>
@@ -10086,11 +11599,22 @@
             <a:noFill/>
           </a:ln>
         </p:spPr>
+        <p:style>
+          <a:lnRef idx="0"/>
+          <a:fillRef idx="0"/>
+          <a:effectRef idx="0"/>
+          <a:fontRef idx="minor"/>
+        </p:style>
         <p:txBody>
           <a:bodyPr lIns="90000" rIns="90000" tIns="45000" bIns="45000">
             <a:noAutofit/>
           </a:bodyPr>
           <a:p>
+            <a:pPr>
+              <a:lnSpc>
+                <a:spcPct val="100000"/>
+              </a:lnSpc>
+            </a:pPr>
             <a:r>
               <a:rPr b="1" lang="en-US" sz="3200" spc="-1" strike="noStrike">
                 <a:solidFill>
@@ -10101,9 +11625,6 @@
               <a:t>mapping</a:t>
             </a:r>
             <a:endParaRPr b="0" lang="en-US" sz="3200" spc="-1" strike="noStrike">
-              <a:solidFill>
-                <a:srgbClr val="000000"/>
-              </a:solidFill>
               <a:latin typeface="Arial"/>
             </a:endParaRPr>
           </a:p>
@@ -10143,7 +11664,7 @@
         <p:spPr>
           <a:xfrm>
             <a:off x="504000" y="404640"/>
-            <a:ext cx="8385480" cy="477360"/>
+            <a:ext cx="8385120" cy="477000"/>
           </a:xfrm>
           <a:prstGeom prst="rect">
             <a:avLst/>
@@ -10194,7 +11715,7 @@
         <p:spPr>
           <a:xfrm>
             <a:off x="504000" y="1340640"/>
-            <a:ext cx="8097120" cy="5397840"/>
+            <a:ext cx="8096760" cy="5397480"/>
           </a:xfrm>
           <a:prstGeom prst="rect">
             <a:avLst/>
@@ -10215,7 +11736,7 @@
             <a:noAutofit/>
           </a:bodyPr>
           <a:p>
-            <a:pPr lvl="1" marL="360000" indent="-357120">
+            <a:pPr lvl="1" marL="360000" indent="-356760">
               <a:lnSpc>
                 <a:spcPct val="100000"/>
               </a:lnSpc>
@@ -10242,7 +11763,7 @@
             </a:endParaRPr>
           </a:p>
           <a:p>
-            <a:pPr lvl="1" marL="360000" indent="-357120">
+            <a:pPr lvl="1" marL="360000" indent="-356760">
               <a:lnSpc>
                 <a:spcPct val="100000"/>
               </a:lnSpc>
@@ -10269,17 +11790,13 @@
             </a:endParaRPr>
           </a:p>
           <a:p>
-            <a:pPr lvl="1" marL="360000" indent="-357120">
+            <a:pPr>
               <a:lnSpc>
                 <a:spcPct val="100000"/>
               </a:lnSpc>
               <a:spcBef>
                 <a:spcPts val="2401"/>
               </a:spcBef>
-              <a:buSzPct val="100000"/>
-              <a:buBlip>
-                <a:blip r:embed="rId3"/>
-              </a:buBlip>
             </a:pPr>
             <a:endParaRPr b="0" lang="en-US" sz="2400" spc="-1" strike="noStrike">
               <a:latin typeface="Arial"/>
@@ -10289,14 +11806,14 @@
       </p:sp>
       <p:sp>
         <p:nvSpPr>
-          <p:cNvPr id="149" name="TextShape 3"/>
-          <p:cNvSpPr txBox="1"/>
+          <p:cNvPr id="149" name="CustomShape 3"/>
+          <p:cNvSpPr/>
           <p:nvPr/>
         </p:nvSpPr>
         <p:spPr>
           <a:xfrm>
             <a:off x="365760" y="4206240"/>
-            <a:ext cx="2377440" cy="1114200"/>
+            <a:ext cx="2377080" cy="1113840"/>
           </a:xfrm>
           <a:prstGeom prst="rect">
             <a:avLst/>
@@ -10306,6 +11823,12 @@
             <a:noFill/>
           </a:ln>
         </p:spPr>
+        <p:style>
+          <a:lnRef idx="0"/>
+          <a:fillRef idx="0"/>
+          <a:effectRef idx="0"/>
+          <a:fontRef idx="minor"/>
+        </p:style>
         <p:txBody>
           <a:bodyPr lIns="90000" rIns="90000" tIns="45000" bIns="45000">
             <a:noAutofit/>
@@ -10337,14 +11860,14 @@
       </p:sp>
       <p:sp>
         <p:nvSpPr>
-          <p:cNvPr id="150" name="TextShape 4"/>
-          <p:cNvSpPr txBox="1"/>
+          <p:cNvPr id="150" name="CustomShape 4"/>
+          <p:cNvSpPr/>
           <p:nvPr/>
         </p:nvSpPr>
         <p:spPr>
           <a:xfrm>
             <a:off x="5325840" y="3494160"/>
-            <a:ext cx="4001040" cy="3291840"/>
+            <a:ext cx="4000680" cy="3291480"/>
           </a:xfrm>
           <a:prstGeom prst="rect">
             <a:avLst/>
@@ -10354,6 +11877,12 @@
             <a:noFill/>
           </a:ln>
         </p:spPr>
+        <p:style>
+          <a:lnRef idx="0"/>
+          <a:fillRef idx="0"/>
+          <a:effectRef idx="0"/>
+          <a:fontRef idx="minor"/>
+        </p:style>
         <p:txBody>
           <a:bodyPr lIns="90000" rIns="90000" tIns="45000" bIns="45000">
             <a:noAutofit/>
@@ -10484,13 +12013,13 @@
         <p:spPr>
           <a:xfrm>
             <a:off x="2926080" y="4297680"/>
-            <a:ext cx="2377440" cy="457200"/>
+            <a:ext cx="2377080" cy="456840"/>
           </a:xfrm>
           <a:custGeom>
             <a:avLst/>
             <a:gdLst/>
             <a:ahLst/>
-            <a:rect l="0" t="0" r="r" b="b"/>
+            <a:rect l="l" t="t" r="r" b="b"/>
             <a:pathLst>
               <a:path w="6606" h="1272">
                 <a:moveTo>
@@ -10570,7 +12099,7 @@
         <p:spPr>
           <a:xfrm>
             <a:off x="504000" y="404640"/>
-            <a:ext cx="8385480" cy="477360"/>
+            <a:ext cx="8385120" cy="477000"/>
           </a:xfrm>
           <a:prstGeom prst="rect">
             <a:avLst/>
@@ -10621,7 +12150,7 @@
         <p:spPr>
           <a:xfrm>
             <a:off x="504000" y="1340640"/>
-            <a:ext cx="8097120" cy="5397840"/>
+            <a:ext cx="8096760" cy="5397480"/>
           </a:xfrm>
           <a:prstGeom prst="rect">
             <a:avLst/>
@@ -10642,7 +12171,7 @@
             <a:noAutofit/>
           </a:bodyPr>
           <a:p>
-            <a:pPr lvl="1" marL="360000" indent="-357120">
+            <a:pPr lvl="1" marL="360000" indent="-356760">
               <a:lnSpc>
                 <a:spcPct val="100000"/>
               </a:lnSpc>
@@ -10669,7 +12198,7 @@
             </a:endParaRPr>
           </a:p>
           <a:p>
-            <a:pPr lvl="1" marL="360000" indent="-357120">
+            <a:pPr lvl="1" marL="360000" indent="-356760">
               <a:lnSpc>
                 <a:spcPct val="100000"/>
               </a:lnSpc>
@@ -10696,7 +12225,7 @@
             </a:endParaRPr>
           </a:p>
           <a:p>
-            <a:pPr lvl="1" marL="360000" indent="-357120">
+            <a:pPr lvl="1" marL="360000" indent="-356760">
               <a:lnSpc>
                 <a:spcPct val="100000"/>
               </a:lnSpc>
@@ -10723,7 +12252,7 @@
             </a:endParaRPr>
           </a:p>
           <a:p>
-            <a:pPr lvl="1" marL="360000" indent="-357120">
+            <a:pPr lvl="1" marL="360000" indent="-356760">
               <a:lnSpc>
                 <a:spcPct val="100000"/>
               </a:lnSpc>
@@ -10750,7 +12279,7 @@
             </a:endParaRPr>
           </a:p>
           <a:p>
-            <a:pPr lvl="1" marL="360000" indent="-357120">
+            <a:pPr lvl="1" marL="360000" indent="-356760">
               <a:lnSpc>
                 <a:spcPct val="100000"/>
               </a:lnSpc>
@@ -10777,7 +12306,7 @@
             </a:endParaRPr>
           </a:p>
           <a:p>
-            <a:pPr lvl="1" marL="360000" indent="-357120">
+            <a:pPr lvl="1" marL="360000" indent="-356760">
               <a:lnSpc>
                 <a:spcPct val="100000"/>
               </a:lnSpc>
@@ -10852,7 +12381,7 @@
         <p:spPr>
           <a:xfrm>
             <a:off x="504000" y="404640"/>
-            <a:ext cx="8385480" cy="477360"/>
+            <a:ext cx="8385120" cy="477000"/>
           </a:xfrm>
           <a:prstGeom prst="rect">
             <a:avLst/>
@@ -10903,7 +12432,7 @@
         <p:spPr>
           <a:xfrm>
             <a:off x="504000" y="1340640"/>
-            <a:ext cx="8097120" cy="5397840"/>
+            <a:ext cx="8096760" cy="5397480"/>
           </a:xfrm>
           <a:prstGeom prst="rect">
             <a:avLst/>
@@ -10924,7 +12453,7 @@
             <a:noAutofit/>
           </a:bodyPr>
           <a:p>
-            <a:pPr lvl="1" marL="360000" indent="-357120">
+            <a:pPr lvl="1" marL="360000" indent="-356760">
               <a:lnSpc>
                 <a:spcPct val="100000"/>
               </a:lnSpc>
@@ -10951,7 +12480,7 @@
             </a:endParaRPr>
           </a:p>
           <a:p>
-            <a:pPr lvl="1" marL="360000" indent="-357120">
+            <a:pPr lvl="1" marL="360000" indent="-356760">
               <a:lnSpc>
                 <a:spcPct val="100000"/>
               </a:lnSpc>
@@ -10978,7 +12507,7 @@
             </a:endParaRPr>
           </a:p>
           <a:p>
-            <a:pPr lvl="1" marL="360000" indent="-357120">
+            <a:pPr lvl="1" marL="360000" indent="-356760">
               <a:lnSpc>
                 <a:spcPct val="100000"/>
               </a:lnSpc>
@@ -11005,7 +12534,7 @@
             </a:endParaRPr>
           </a:p>
           <a:p>
-            <a:pPr lvl="1" marL="360000" indent="-357120">
+            <a:pPr lvl="1" marL="360000" indent="-356760">
               <a:lnSpc>
                 <a:spcPct val="100000"/>
               </a:lnSpc>
@@ -11032,7 +12561,7 @@
             </a:endParaRPr>
           </a:p>
           <a:p>
-            <a:pPr lvl="1" marL="360000" indent="-357120">
+            <a:pPr lvl="1" marL="360000" indent="-356760">
               <a:lnSpc>
                 <a:spcPct val="100000"/>
               </a:lnSpc>
@@ -11059,7 +12588,7 @@
             </a:endParaRPr>
           </a:p>
           <a:p>
-            <a:pPr lvl="1" marL="360000" indent="-357120">
+            <a:pPr lvl="1" marL="360000" indent="-356760">
               <a:lnSpc>
                 <a:spcPct val="100000"/>
               </a:lnSpc>
@@ -11086,7 +12615,7 @@
             </a:endParaRPr>
           </a:p>
           <a:p>
-            <a:pPr lvl="1" marL="360000" indent="-357120">
+            <a:pPr lvl="1" marL="360000" indent="-356760">
               <a:lnSpc>
                 <a:spcPct val="100000"/>
               </a:lnSpc>
@@ -11161,7 +12690,7 @@
         <p:spPr>
           <a:xfrm>
             <a:off x="504000" y="404640"/>
-            <a:ext cx="8385480" cy="477360"/>
+            <a:ext cx="8385120" cy="477000"/>
           </a:xfrm>
           <a:prstGeom prst="rect">
             <a:avLst/>
@@ -11212,7 +12741,7 @@
         <p:spPr>
           <a:xfrm>
             <a:off x="504000" y="1340640"/>
-            <a:ext cx="8097120" cy="5397840"/>
+            <a:ext cx="8096760" cy="5397480"/>
           </a:xfrm>
           <a:prstGeom prst="rect">
             <a:avLst/>
@@ -11291,7 +12820,7 @@
             </a:endParaRPr>
           </a:p>
           <a:p>
-            <a:pPr lvl="1" marL="360000" indent="-357120">
+            <a:pPr lvl="1" marL="360000" indent="-356760">
               <a:lnSpc>
                 <a:spcPct val="100000"/>
               </a:lnSpc>
@@ -11318,7 +12847,7 @@
             </a:endParaRPr>
           </a:p>
           <a:p>
-            <a:pPr lvl="1" marL="360000" indent="-357120">
+            <a:pPr lvl="1" marL="360000" indent="-356760">
               <a:lnSpc>
                 <a:spcPct val="100000"/>
               </a:lnSpc>
@@ -11345,7 +12874,7 @@
             </a:endParaRPr>
           </a:p>
           <a:p>
-            <a:pPr lvl="1" marL="360000" indent="-357120">
+            <a:pPr lvl="1" marL="360000" indent="-356760">
               <a:lnSpc>
                 <a:spcPct val="100000"/>
               </a:lnSpc>
@@ -11412,7 +12941,7 @@
         <p:spPr>
           <a:xfrm>
             <a:off x="4572000" y="2025720"/>
-            <a:ext cx="4440960" cy="4648680"/>
+            <a:ext cx="4440600" cy="4648320"/>
           </a:xfrm>
           <a:prstGeom prst="rect">
             <a:avLst/>
@@ -11460,7 +12989,7 @@
         <p:spPr>
           <a:xfrm>
             <a:off x="0" y="1554480"/>
-            <a:ext cx="9142920" cy="6553440"/>
+            <a:ext cx="9142560" cy="6553080"/>
           </a:xfrm>
           <a:prstGeom prst="rect">
             <a:avLst/>
@@ -11479,7 +13008,7 @@
         <p:spPr>
           <a:xfrm>
             <a:off x="504000" y="404640"/>
-            <a:ext cx="8385480" cy="477360"/>
+            <a:ext cx="8385120" cy="477000"/>
           </a:xfrm>
           <a:prstGeom prst="rect">
             <a:avLst/>
@@ -11530,7 +13059,7 @@
         <p:spPr>
           <a:xfrm>
             <a:off x="504000" y="1340640"/>
-            <a:ext cx="8097120" cy="5397840"/>
+            <a:ext cx="8096760" cy="5397480"/>
           </a:xfrm>
           <a:prstGeom prst="rect">
             <a:avLst/>

</xml_diff>